<commit_message>
To do list 기능 구현
</commit_message>
<xml_diff>
--- a/Todolist 개발 계획.pptx
+++ b/Todolist 개발 계획.pptx
@@ -6,9 +6,7 @@
   </p:sldMasterIdLst>
   <p:sldIdLst>
     <p:sldId id="256" r:id="rId2"/>
-    <p:sldId id="259" r:id="rId3"/>
-    <p:sldId id="260" r:id="rId4"/>
-    <p:sldId id="261" r:id="rId5"/>
+    <p:sldId id="257" r:id="rId3"/>
   </p:sldIdLst>
   <p:sldSz cx="12192000" cy="6858000"/>
   <p:notesSz cx="6858000" cy="9144000"/>
@@ -107,11 +105,6 @@
       </a:defRPr>
     </a:lvl9pPr>
   </p:defaultTextStyle>
-  <p:extLst>
-    <p:ext uri="{EFAFB233-063F-42B5-8137-9DF3F51BA10A}">
-      <p15:sldGuideLst xmlns:p15="http://schemas.microsoft.com/office/powerpoint/2012/main"/>
-    </p:ext>
-  </p:extLst>
 </p:presentation>
 </file>
 
@@ -244,9 +237,9 @@
           <a:bodyPr/>
           <a:lstStyle/>
           <a:p>
-            <a:fld id="{3693EBA0-EB17-48A6-BCF9-7400837A187E}" type="datetimeFigureOut">
-              <a:rPr lang="ko-KR" altLang="en-US" smtClean="0"/>
-              <a:t>2021-08-02</a:t>
+            <a:fld id="{B72D0A1A-9EB6-43A1-83DB-3B7705366C53}" type="datetimeFigureOut">
+              <a:rPr lang="ko-KR" altLang="en-US" smtClean="0"/>
+              <a:t>2021-08-06</a:t>
             </a:fld>
             <a:endParaRPr lang="ko-KR" altLang="en-US"/>
           </a:p>
@@ -286,7 +279,7 @@
           <a:bodyPr/>
           <a:lstStyle/>
           <a:p>
-            <a:fld id="{277041D0-1355-4694-A655-52A50A12AB91}" type="slidenum">
+            <a:fld id="{CD99E9AD-96B5-4CE7-999E-EEA0E875B534}" type="slidenum">
               <a:rPr lang="ko-KR" altLang="en-US" smtClean="0"/>
               <a:t>‹#›</a:t>
             </a:fld>
@@ -297,7 +290,7 @@
     </p:spTree>
     <p:extLst>
       <p:ext uri="{BB962C8B-B14F-4D97-AF65-F5344CB8AC3E}">
-        <p14:creationId xmlns:p14="http://schemas.microsoft.com/office/powerpoint/2010/main" val="2917609507"/>
+        <p14:creationId xmlns:p14="http://schemas.microsoft.com/office/powerpoint/2010/main" val="587513290"/>
       </p:ext>
     </p:extLst>
   </p:cSld>
@@ -414,9 +407,9 @@
           <a:bodyPr/>
           <a:lstStyle/>
           <a:p>
-            <a:fld id="{3693EBA0-EB17-48A6-BCF9-7400837A187E}" type="datetimeFigureOut">
-              <a:rPr lang="ko-KR" altLang="en-US" smtClean="0"/>
-              <a:t>2021-08-02</a:t>
+            <a:fld id="{B72D0A1A-9EB6-43A1-83DB-3B7705366C53}" type="datetimeFigureOut">
+              <a:rPr lang="ko-KR" altLang="en-US" smtClean="0"/>
+              <a:t>2021-08-06</a:t>
             </a:fld>
             <a:endParaRPr lang="ko-KR" altLang="en-US"/>
           </a:p>
@@ -456,7 +449,7 @@
           <a:bodyPr/>
           <a:lstStyle/>
           <a:p>
-            <a:fld id="{277041D0-1355-4694-A655-52A50A12AB91}" type="slidenum">
+            <a:fld id="{CD99E9AD-96B5-4CE7-999E-EEA0E875B534}" type="slidenum">
               <a:rPr lang="ko-KR" altLang="en-US" smtClean="0"/>
               <a:t>‹#›</a:t>
             </a:fld>
@@ -467,7 +460,7 @@
     </p:spTree>
     <p:extLst>
       <p:ext uri="{BB962C8B-B14F-4D97-AF65-F5344CB8AC3E}">
-        <p14:creationId xmlns:p14="http://schemas.microsoft.com/office/powerpoint/2010/main" val="3120100912"/>
+        <p14:creationId xmlns:p14="http://schemas.microsoft.com/office/powerpoint/2010/main" val="2383323048"/>
       </p:ext>
     </p:extLst>
   </p:cSld>
@@ -594,9 +587,9 @@
           <a:bodyPr/>
           <a:lstStyle/>
           <a:p>
-            <a:fld id="{3693EBA0-EB17-48A6-BCF9-7400837A187E}" type="datetimeFigureOut">
-              <a:rPr lang="ko-KR" altLang="en-US" smtClean="0"/>
-              <a:t>2021-08-02</a:t>
+            <a:fld id="{B72D0A1A-9EB6-43A1-83DB-3B7705366C53}" type="datetimeFigureOut">
+              <a:rPr lang="ko-KR" altLang="en-US" smtClean="0"/>
+              <a:t>2021-08-06</a:t>
             </a:fld>
             <a:endParaRPr lang="ko-KR" altLang="en-US"/>
           </a:p>
@@ -636,7 +629,7 @@
           <a:bodyPr/>
           <a:lstStyle/>
           <a:p>
-            <a:fld id="{277041D0-1355-4694-A655-52A50A12AB91}" type="slidenum">
+            <a:fld id="{CD99E9AD-96B5-4CE7-999E-EEA0E875B534}" type="slidenum">
               <a:rPr lang="ko-KR" altLang="en-US" smtClean="0"/>
               <a:t>‹#›</a:t>
             </a:fld>
@@ -647,7 +640,7 @@
     </p:spTree>
     <p:extLst>
       <p:ext uri="{BB962C8B-B14F-4D97-AF65-F5344CB8AC3E}">
-        <p14:creationId xmlns:p14="http://schemas.microsoft.com/office/powerpoint/2010/main" val="2813737018"/>
+        <p14:creationId xmlns:p14="http://schemas.microsoft.com/office/powerpoint/2010/main" val="2101271059"/>
       </p:ext>
     </p:extLst>
   </p:cSld>
@@ -764,9 +757,9 @@
           <a:bodyPr/>
           <a:lstStyle/>
           <a:p>
-            <a:fld id="{3693EBA0-EB17-48A6-BCF9-7400837A187E}" type="datetimeFigureOut">
-              <a:rPr lang="ko-KR" altLang="en-US" smtClean="0"/>
-              <a:t>2021-08-02</a:t>
+            <a:fld id="{B72D0A1A-9EB6-43A1-83DB-3B7705366C53}" type="datetimeFigureOut">
+              <a:rPr lang="ko-KR" altLang="en-US" smtClean="0"/>
+              <a:t>2021-08-06</a:t>
             </a:fld>
             <a:endParaRPr lang="ko-KR" altLang="en-US"/>
           </a:p>
@@ -806,7 +799,7 @@
           <a:bodyPr/>
           <a:lstStyle/>
           <a:p>
-            <a:fld id="{277041D0-1355-4694-A655-52A50A12AB91}" type="slidenum">
+            <a:fld id="{CD99E9AD-96B5-4CE7-999E-EEA0E875B534}" type="slidenum">
               <a:rPr lang="ko-KR" altLang="en-US" smtClean="0"/>
               <a:t>‹#›</a:t>
             </a:fld>
@@ -817,7 +810,7 @@
     </p:spTree>
     <p:extLst>
       <p:ext uri="{BB962C8B-B14F-4D97-AF65-F5344CB8AC3E}">
-        <p14:creationId xmlns:p14="http://schemas.microsoft.com/office/powerpoint/2010/main" val="2875700994"/>
+        <p14:creationId xmlns:p14="http://schemas.microsoft.com/office/powerpoint/2010/main" val="2912827120"/>
       </p:ext>
     </p:extLst>
   </p:cSld>
@@ -1010,9 +1003,9 @@
           <a:bodyPr/>
           <a:lstStyle/>
           <a:p>
-            <a:fld id="{3693EBA0-EB17-48A6-BCF9-7400837A187E}" type="datetimeFigureOut">
-              <a:rPr lang="ko-KR" altLang="en-US" smtClean="0"/>
-              <a:t>2021-08-02</a:t>
+            <a:fld id="{B72D0A1A-9EB6-43A1-83DB-3B7705366C53}" type="datetimeFigureOut">
+              <a:rPr lang="ko-KR" altLang="en-US" smtClean="0"/>
+              <a:t>2021-08-06</a:t>
             </a:fld>
             <a:endParaRPr lang="ko-KR" altLang="en-US"/>
           </a:p>
@@ -1052,7 +1045,7 @@
           <a:bodyPr/>
           <a:lstStyle/>
           <a:p>
-            <a:fld id="{277041D0-1355-4694-A655-52A50A12AB91}" type="slidenum">
+            <a:fld id="{CD99E9AD-96B5-4CE7-999E-EEA0E875B534}" type="slidenum">
               <a:rPr lang="ko-KR" altLang="en-US" smtClean="0"/>
               <a:t>‹#›</a:t>
             </a:fld>
@@ -1063,7 +1056,7 @@
     </p:spTree>
     <p:extLst>
       <p:ext uri="{BB962C8B-B14F-4D97-AF65-F5344CB8AC3E}">
-        <p14:creationId xmlns:p14="http://schemas.microsoft.com/office/powerpoint/2010/main" val="1412938020"/>
+        <p14:creationId xmlns:p14="http://schemas.microsoft.com/office/powerpoint/2010/main" val="4200836056"/>
       </p:ext>
     </p:extLst>
   </p:cSld>
@@ -1242,9 +1235,9 @@
           <a:bodyPr/>
           <a:lstStyle/>
           <a:p>
-            <a:fld id="{3693EBA0-EB17-48A6-BCF9-7400837A187E}" type="datetimeFigureOut">
-              <a:rPr lang="ko-KR" altLang="en-US" smtClean="0"/>
-              <a:t>2021-08-02</a:t>
+            <a:fld id="{B72D0A1A-9EB6-43A1-83DB-3B7705366C53}" type="datetimeFigureOut">
+              <a:rPr lang="ko-KR" altLang="en-US" smtClean="0"/>
+              <a:t>2021-08-06</a:t>
             </a:fld>
             <a:endParaRPr lang="ko-KR" altLang="en-US"/>
           </a:p>
@@ -1284,7 +1277,7 @@
           <a:bodyPr/>
           <a:lstStyle/>
           <a:p>
-            <a:fld id="{277041D0-1355-4694-A655-52A50A12AB91}" type="slidenum">
+            <a:fld id="{CD99E9AD-96B5-4CE7-999E-EEA0E875B534}" type="slidenum">
               <a:rPr lang="ko-KR" altLang="en-US" smtClean="0"/>
               <a:t>‹#›</a:t>
             </a:fld>
@@ -1295,7 +1288,7 @@
     </p:spTree>
     <p:extLst>
       <p:ext uri="{BB962C8B-B14F-4D97-AF65-F5344CB8AC3E}">
-        <p14:creationId xmlns:p14="http://schemas.microsoft.com/office/powerpoint/2010/main" val="3193704785"/>
+        <p14:creationId xmlns:p14="http://schemas.microsoft.com/office/powerpoint/2010/main" val="205249502"/>
       </p:ext>
     </p:extLst>
   </p:cSld>
@@ -1609,9 +1602,9 @@
           <a:bodyPr/>
           <a:lstStyle/>
           <a:p>
-            <a:fld id="{3693EBA0-EB17-48A6-BCF9-7400837A187E}" type="datetimeFigureOut">
-              <a:rPr lang="ko-KR" altLang="en-US" smtClean="0"/>
-              <a:t>2021-08-02</a:t>
+            <a:fld id="{B72D0A1A-9EB6-43A1-83DB-3B7705366C53}" type="datetimeFigureOut">
+              <a:rPr lang="ko-KR" altLang="en-US" smtClean="0"/>
+              <a:t>2021-08-06</a:t>
             </a:fld>
             <a:endParaRPr lang="ko-KR" altLang="en-US"/>
           </a:p>
@@ -1651,7 +1644,7 @@
           <a:bodyPr/>
           <a:lstStyle/>
           <a:p>
-            <a:fld id="{277041D0-1355-4694-A655-52A50A12AB91}" type="slidenum">
+            <a:fld id="{CD99E9AD-96B5-4CE7-999E-EEA0E875B534}" type="slidenum">
               <a:rPr lang="ko-KR" altLang="en-US" smtClean="0"/>
               <a:t>‹#›</a:t>
             </a:fld>
@@ -1662,7 +1655,7 @@
     </p:spTree>
     <p:extLst>
       <p:ext uri="{BB962C8B-B14F-4D97-AF65-F5344CB8AC3E}">
-        <p14:creationId xmlns:p14="http://schemas.microsoft.com/office/powerpoint/2010/main" val="650582016"/>
+        <p14:creationId xmlns:p14="http://schemas.microsoft.com/office/powerpoint/2010/main" val="342045139"/>
       </p:ext>
     </p:extLst>
   </p:cSld>
@@ -1727,9 +1720,9 @@
           <a:bodyPr/>
           <a:lstStyle/>
           <a:p>
-            <a:fld id="{3693EBA0-EB17-48A6-BCF9-7400837A187E}" type="datetimeFigureOut">
-              <a:rPr lang="ko-KR" altLang="en-US" smtClean="0"/>
-              <a:t>2021-08-02</a:t>
+            <a:fld id="{B72D0A1A-9EB6-43A1-83DB-3B7705366C53}" type="datetimeFigureOut">
+              <a:rPr lang="ko-KR" altLang="en-US" smtClean="0"/>
+              <a:t>2021-08-06</a:t>
             </a:fld>
             <a:endParaRPr lang="ko-KR" altLang="en-US"/>
           </a:p>
@@ -1769,7 +1762,7 @@
           <a:bodyPr/>
           <a:lstStyle/>
           <a:p>
-            <a:fld id="{277041D0-1355-4694-A655-52A50A12AB91}" type="slidenum">
+            <a:fld id="{CD99E9AD-96B5-4CE7-999E-EEA0E875B534}" type="slidenum">
               <a:rPr lang="ko-KR" altLang="en-US" smtClean="0"/>
               <a:t>‹#›</a:t>
             </a:fld>
@@ -1780,7 +1773,7 @@
     </p:spTree>
     <p:extLst>
       <p:ext uri="{BB962C8B-B14F-4D97-AF65-F5344CB8AC3E}">
-        <p14:creationId xmlns:p14="http://schemas.microsoft.com/office/powerpoint/2010/main" val="2479802891"/>
+        <p14:creationId xmlns:p14="http://schemas.microsoft.com/office/powerpoint/2010/main" val="1667727387"/>
       </p:ext>
     </p:extLst>
   </p:cSld>
@@ -1822,9 +1815,9 @@
           <a:bodyPr/>
           <a:lstStyle/>
           <a:p>
-            <a:fld id="{3693EBA0-EB17-48A6-BCF9-7400837A187E}" type="datetimeFigureOut">
-              <a:rPr lang="ko-KR" altLang="en-US" smtClean="0"/>
-              <a:t>2021-08-02</a:t>
+            <a:fld id="{B72D0A1A-9EB6-43A1-83DB-3B7705366C53}" type="datetimeFigureOut">
+              <a:rPr lang="ko-KR" altLang="en-US" smtClean="0"/>
+              <a:t>2021-08-06</a:t>
             </a:fld>
             <a:endParaRPr lang="ko-KR" altLang="en-US"/>
           </a:p>
@@ -1864,7 +1857,7 @@
           <a:bodyPr/>
           <a:lstStyle/>
           <a:p>
-            <a:fld id="{277041D0-1355-4694-A655-52A50A12AB91}" type="slidenum">
+            <a:fld id="{CD99E9AD-96B5-4CE7-999E-EEA0E875B534}" type="slidenum">
               <a:rPr lang="ko-KR" altLang="en-US" smtClean="0"/>
               <a:t>‹#›</a:t>
             </a:fld>
@@ -1875,7 +1868,7 @@
     </p:spTree>
     <p:extLst>
       <p:ext uri="{BB962C8B-B14F-4D97-AF65-F5344CB8AC3E}">
-        <p14:creationId xmlns:p14="http://schemas.microsoft.com/office/powerpoint/2010/main" val="2432683262"/>
+        <p14:creationId xmlns:p14="http://schemas.microsoft.com/office/powerpoint/2010/main" val="2297131548"/>
       </p:ext>
     </p:extLst>
   </p:cSld>
@@ -2099,9 +2092,9 @@
           <a:bodyPr/>
           <a:lstStyle/>
           <a:p>
-            <a:fld id="{3693EBA0-EB17-48A6-BCF9-7400837A187E}" type="datetimeFigureOut">
-              <a:rPr lang="ko-KR" altLang="en-US" smtClean="0"/>
-              <a:t>2021-08-02</a:t>
+            <a:fld id="{B72D0A1A-9EB6-43A1-83DB-3B7705366C53}" type="datetimeFigureOut">
+              <a:rPr lang="ko-KR" altLang="en-US" smtClean="0"/>
+              <a:t>2021-08-06</a:t>
             </a:fld>
             <a:endParaRPr lang="ko-KR" altLang="en-US"/>
           </a:p>
@@ -2141,7 +2134,7 @@
           <a:bodyPr/>
           <a:lstStyle/>
           <a:p>
-            <a:fld id="{277041D0-1355-4694-A655-52A50A12AB91}" type="slidenum">
+            <a:fld id="{CD99E9AD-96B5-4CE7-999E-EEA0E875B534}" type="slidenum">
               <a:rPr lang="ko-KR" altLang="en-US" smtClean="0"/>
               <a:t>‹#›</a:t>
             </a:fld>
@@ -2152,7 +2145,7 @@
     </p:spTree>
     <p:extLst>
       <p:ext uri="{BB962C8B-B14F-4D97-AF65-F5344CB8AC3E}">
-        <p14:creationId xmlns:p14="http://schemas.microsoft.com/office/powerpoint/2010/main" val="61237899"/>
+        <p14:creationId xmlns:p14="http://schemas.microsoft.com/office/powerpoint/2010/main" val="1483572788"/>
       </p:ext>
     </p:extLst>
   </p:cSld>
@@ -2352,9 +2345,9 @@
           <a:bodyPr/>
           <a:lstStyle/>
           <a:p>
-            <a:fld id="{3693EBA0-EB17-48A6-BCF9-7400837A187E}" type="datetimeFigureOut">
-              <a:rPr lang="ko-KR" altLang="en-US" smtClean="0"/>
-              <a:t>2021-08-02</a:t>
+            <a:fld id="{B72D0A1A-9EB6-43A1-83DB-3B7705366C53}" type="datetimeFigureOut">
+              <a:rPr lang="ko-KR" altLang="en-US" smtClean="0"/>
+              <a:t>2021-08-06</a:t>
             </a:fld>
             <a:endParaRPr lang="ko-KR" altLang="en-US"/>
           </a:p>
@@ -2394,7 +2387,7 @@
           <a:bodyPr/>
           <a:lstStyle/>
           <a:p>
-            <a:fld id="{277041D0-1355-4694-A655-52A50A12AB91}" type="slidenum">
+            <a:fld id="{CD99E9AD-96B5-4CE7-999E-EEA0E875B534}" type="slidenum">
               <a:rPr lang="ko-KR" altLang="en-US" smtClean="0"/>
               <a:t>‹#›</a:t>
             </a:fld>
@@ -2405,7 +2398,7 @@
     </p:spTree>
     <p:extLst>
       <p:ext uri="{BB962C8B-B14F-4D97-AF65-F5344CB8AC3E}">
-        <p14:creationId xmlns:p14="http://schemas.microsoft.com/office/powerpoint/2010/main" val="4095775271"/>
+        <p14:creationId xmlns:p14="http://schemas.microsoft.com/office/powerpoint/2010/main" val="2226048214"/>
       </p:ext>
     </p:extLst>
   </p:cSld>
@@ -2565,9 +2558,9 @@
             </a:lvl1pPr>
           </a:lstStyle>
           <a:p>
-            <a:fld id="{3693EBA0-EB17-48A6-BCF9-7400837A187E}" type="datetimeFigureOut">
-              <a:rPr lang="ko-KR" altLang="en-US" smtClean="0"/>
-              <a:t>2021-08-02</a:t>
+            <a:fld id="{B72D0A1A-9EB6-43A1-83DB-3B7705366C53}" type="datetimeFigureOut">
+              <a:rPr lang="ko-KR" altLang="en-US" smtClean="0"/>
+              <a:t>2021-08-06</a:t>
             </a:fld>
             <a:endParaRPr lang="ko-KR" altLang="en-US"/>
           </a:p>
@@ -2643,7 +2636,7 @@
             </a:lvl1pPr>
           </a:lstStyle>
           <a:p>
-            <a:fld id="{277041D0-1355-4694-A655-52A50A12AB91}" type="slidenum">
+            <a:fld id="{CD99E9AD-96B5-4CE7-999E-EEA0E875B534}" type="slidenum">
               <a:rPr lang="ko-KR" altLang="en-US" smtClean="0"/>
               <a:t>‹#›</a:t>
             </a:fld>
@@ -2654,7 +2647,7 @@
     </p:spTree>
     <p:extLst>
       <p:ext uri="{BB962C8B-B14F-4D97-AF65-F5344CB8AC3E}">
-        <p14:creationId xmlns:p14="http://schemas.microsoft.com/office/powerpoint/2010/main" val="1106235795"/>
+        <p14:creationId xmlns:p14="http://schemas.microsoft.com/office/powerpoint/2010/main" val="1212864300"/>
       </p:ext>
     </p:extLst>
   </p:cSld>
@@ -2987,26 +2980,33 @@
           <a:bodyPr/>
           <a:lstStyle/>
           <a:p>
-            <a:r>
-              <a:rPr lang="en-US" altLang="ko-KR" dirty="0" err="1" smtClean="0"/>
-              <a:t>Todolist</a:t>
-            </a:r>
-            <a:r>
-              <a:rPr lang="en-US" altLang="ko-KR" dirty="0" smtClean="0"/>
-              <a:t> </a:t>
-            </a:r>
-            <a:r>
-              <a:rPr lang="ko-KR" altLang="en-US" dirty="0" smtClean="0"/>
-              <a:t>개발 계획</a:t>
-            </a:r>
             <a:endParaRPr lang="ko-KR" altLang="en-US" dirty="0"/>
+          </a:p>
+        </p:txBody>
+      </p:sp>
+      <p:sp>
+        <p:nvSpPr>
+          <p:cNvPr id="3" name="부제목 2"/>
+          <p:cNvSpPr>
+            <a:spLocks noGrp="1"/>
+          </p:cNvSpPr>
+          <p:nvPr>
+            <p:ph type="subTitle" idx="1"/>
+          </p:nvPr>
+        </p:nvSpPr>
+        <p:spPr/>
+        <p:txBody>
+          <a:bodyPr/>
+          <a:lstStyle/>
+          <a:p>
+            <a:endParaRPr lang="ko-KR" altLang="en-US"/>
           </a:p>
         </p:txBody>
       </p:sp>
     </p:spTree>
     <p:extLst>
       <p:ext uri="{BB962C8B-B14F-4D97-AF65-F5344CB8AC3E}">
-        <p14:creationId xmlns:p14="http://schemas.microsoft.com/office/powerpoint/2010/main" val="3101040248"/>
+        <p14:creationId xmlns:p14="http://schemas.microsoft.com/office/powerpoint/2010/main" val="3718656966"/>
       </p:ext>
     </p:extLst>
   </p:cSld>
@@ -3033,2248 +3033,83 @@
           <a:chExt cx="0" cy="0"/>
         </a:xfrm>
       </p:grpSpPr>
-      <p:sp>
-        <p:nvSpPr>
-          <p:cNvPr id="4" name="직사각형 3"/>
-          <p:cNvSpPr/>
+      <p:grpSp>
+        <p:nvGrpSpPr>
+          <p:cNvPr id="6" name="그룹 5"/>
+          <p:cNvGrpSpPr/>
           <p:nvPr/>
-        </p:nvSpPr>
-        <p:spPr>
+        </p:nvGrpSpPr>
+        <p:grpSpPr>
           <a:xfrm>
-            <a:off x="3067664" y="0"/>
-            <a:ext cx="6754762" cy="707923"/>
+            <a:off x="1544783" y="1857830"/>
+            <a:ext cx="9336792" cy="4397828"/>
+            <a:chOff x="601354" y="804020"/>
+            <a:chExt cx="7907152" cy="3724437"/>
           </a:xfrm>
-          <a:prstGeom prst="rect">
-            <a:avLst/>
-          </a:prstGeom>
-          <a:solidFill>
-            <a:schemeClr val="accent6"/>
-          </a:solidFill>
-        </p:spPr>
-        <p:style>
-          <a:lnRef idx="2">
-            <a:schemeClr val="accent1">
-              <a:shade val="50000"/>
-            </a:schemeClr>
-          </a:lnRef>
-          <a:fillRef idx="1">
-            <a:schemeClr val="accent1"/>
-          </a:fillRef>
-          <a:effectRef idx="0">
-            <a:schemeClr val="accent1"/>
-          </a:effectRef>
-          <a:fontRef idx="minor">
-            <a:schemeClr val="lt1"/>
-          </a:fontRef>
-        </p:style>
-        <p:txBody>
-          <a:bodyPr rtlCol="0" anchor="ctr"/>
-          <a:lstStyle/>
-          <a:p>
-            <a:pPr algn="ctr"/>
-            <a:endParaRPr lang="ko-KR" altLang="en-US" dirty="0"/>
-          </a:p>
-        </p:txBody>
-      </p:sp>
-      <p:sp>
-        <p:nvSpPr>
-          <p:cNvPr id="5" name="직사각형 4"/>
-          <p:cNvSpPr/>
-          <p:nvPr/>
-        </p:nvSpPr>
-        <p:spPr>
-          <a:xfrm>
-            <a:off x="3067664" y="707923"/>
-            <a:ext cx="6754762" cy="6150077"/>
-          </a:xfrm>
-          <a:prstGeom prst="rect">
-            <a:avLst/>
-          </a:prstGeom>
-          <a:solidFill>
-            <a:schemeClr val="accent6">
-              <a:lumMod val="20000"/>
-              <a:lumOff val="80000"/>
-            </a:schemeClr>
-          </a:solidFill>
-        </p:spPr>
-        <p:style>
-          <a:lnRef idx="2">
-            <a:schemeClr val="accent1">
-              <a:shade val="50000"/>
-            </a:schemeClr>
-          </a:lnRef>
-          <a:fillRef idx="1">
-            <a:schemeClr val="accent1"/>
-          </a:fillRef>
-          <a:effectRef idx="0">
-            <a:schemeClr val="accent1"/>
-          </a:effectRef>
-          <a:fontRef idx="minor">
-            <a:schemeClr val="lt1"/>
-          </a:fontRef>
-        </p:style>
-        <p:txBody>
-          <a:bodyPr rtlCol="0" anchor="ctr"/>
-          <a:lstStyle/>
-          <a:p>
-            <a:pPr algn="ctr"/>
-            <a:endParaRPr lang="ko-KR" altLang="en-US"/>
-          </a:p>
-        </p:txBody>
-      </p:sp>
-      <p:sp>
-        <p:nvSpPr>
-          <p:cNvPr id="7" name="직사각형 6"/>
-          <p:cNvSpPr/>
-          <p:nvPr/>
-        </p:nvSpPr>
-        <p:spPr>
-          <a:xfrm>
-            <a:off x="0" y="0"/>
-            <a:ext cx="2168013" cy="707923"/>
-          </a:xfrm>
-          <a:prstGeom prst="rect">
-            <a:avLst/>
-          </a:prstGeom>
-        </p:spPr>
-        <p:style>
-          <a:lnRef idx="2">
-            <a:schemeClr val="accent1">
-              <a:shade val="50000"/>
-            </a:schemeClr>
-          </a:lnRef>
-          <a:fillRef idx="1">
-            <a:schemeClr val="accent1"/>
-          </a:fillRef>
-          <a:effectRef idx="0">
-            <a:schemeClr val="accent1"/>
-          </a:effectRef>
-          <a:fontRef idx="minor">
-            <a:schemeClr val="lt1"/>
-          </a:fontRef>
-        </p:style>
-        <p:txBody>
-          <a:bodyPr rtlCol="0" anchor="ctr"/>
-          <a:lstStyle/>
-          <a:p>
-            <a:pPr algn="ctr"/>
-            <a:r>
-              <a:rPr lang="ko-KR" altLang="en-US" dirty="0" smtClean="0"/>
-              <a:t>리스트 보기</a:t>
-            </a:r>
-            <a:endParaRPr lang="en-US" altLang="ko-KR" dirty="0" smtClean="0"/>
-          </a:p>
-        </p:txBody>
-      </p:sp>
-      <p:sp>
-        <p:nvSpPr>
-          <p:cNvPr id="2" name="직사각형 1"/>
-          <p:cNvSpPr/>
-          <p:nvPr/>
-        </p:nvSpPr>
-        <p:spPr>
-          <a:xfrm>
-            <a:off x="8406580" y="1415846"/>
-            <a:ext cx="412955" cy="383457"/>
-          </a:xfrm>
-          <a:prstGeom prst="rect">
-            <a:avLst/>
-          </a:prstGeom>
-          <a:solidFill>
-            <a:schemeClr val="bg1"/>
-          </a:solidFill>
-        </p:spPr>
-        <p:style>
-          <a:lnRef idx="2">
-            <a:schemeClr val="accent1">
-              <a:shade val="50000"/>
-            </a:schemeClr>
-          </a:lnRef>
-          <a:fillRef idx="1">
-            <a:schemeClr val="accent1"/>
-          </a:fillRef>
-          <a:effectRef idx="0">
-            <a:schemeClr val="accent1"/>
-          </a:effectRef>
-          <a:fontRef idx="minor">
-            <a:schemeClr val="lt1"/>
-          </a:fontRef>
-        </p:style>
-        <p:txBody>
-          <a:bodyPr rtlCol="0" anchor="ctr"/>
-          <a:lstStyle/>
-          <a:p>
-            <a:pPr algn="ctr"/>
-            <a:endParaRPr lang="ko-KR" altLang="en-US"/>
-          </a:p>
-        </p:txBody>
-      </p:sp>
-      <p:sp>
-        <p:nvSpPr>
-          <p:cNvPr id="6" name="직사각형 5"/>
-          <p:cNvSpPr/>
-          <p:nvPr/>
-        </p:nvSpPr>
-        <p:spPr>
-          <a:xfrm>
-            <a:off x="8450825" y="2182762"/>
-            <a:ext cx="412955" cy="383457"/>
-          </a:xfrm>
-          <a:prstGeom prst="rect">
-            <a:avLst/>
-          </a:prstGeom>
-          <a:solidFill>
-            <a:schemeClr val="bg1"/>
-          </a:solidFill>
-        </p:spPr>
-        <p:style>
-          <a:lnRef idx="2">
-            <a:schemeClr val="accent1">
-              <a:shade val="50000"/>
-            </a:schemeClr>
-          </a:lnRef>
-          <a:fillRef idx="1">
-            <a:schemeClr val="accent1"/>
-          </a:fillRef>
-          <a:effectRef idx="0">
-            <a:schemeClr val="accent1"/>
-          </a:effectRef>
-          <a:fontRef idx="minor">
-            <a:schemeClr val="lt1"/>
-          </a:fontRef>
-        </p:style>
-        <p:txBody>
-          <a:bodyPr rtlCol="0" anchor="ctr"/>
-          <a:lstStyle/>
-          <a:p>
-            <a:pPr algn="ctr"/>
-            <a:endParaRPr lang="ko-KR" altLang="en-US"/>
-          </a:p>
-        </p:txBody>
-      </p:sp>
-      <p:sp>
-        <p:nvSpPr>
-          <p:cNvPr id="8" name="직사각형 7"/>
-          <p:cNvSpPr/>
-          <p:nvPr/>
-        </p:nvSpPr>
-        <p:spPr>
-          <a:xfrm>
-            <a:off x="8450825" y="2920182"/>
-            <a:ext cx="412955" cy="383457"/>
-          </a:xfrm>
-          <a:prstGeom prst="rect">
-            <a:avLst/>
-          </a:prstGeom>
-          <a:solidFill>
-            <a:schemeClr val="bg1"/>
-          </a:solidFill>
-        </p:spPr>
-        <p:style>
-          <a:lnRef idx="2">
-            <a:schemeClr val="accent1">
-              <a:shade val="50000"/>
-            </a:schemeClr>
-          </a:lnRef>
-          <a:fillRef idx="1">
-            <a:schemeClr val="accent1"/>
-          </a:fillRef>
-          <a:effectRef idx="0">
-            <a:schemeClr val="accent1"/>
-          </a:effectRef>
-          <a:fontRef idx="minor">
-            <a:schemeClr val="lt1"/>
-          </a:fontRef>
-        </p:style>
-        <p:txBody>
-          <a:bodyPr rtlCol="0" anchor="ctr"/>
-          <a:lstStyle/>
-          <a:p>
-            <a:pPr algn="ctr"/>
-            <a:endParaRPr lang="ko-KR" altLang="en-US"/>
-          </a:p>
-        </p:txBody>
-      </p:sp>
-      <p:sp>
-        <p:nvSpPr>
-          <p:cNvPr id="9" name="직사각형 8"/>
-          <p:cNvSpPr/>
-          <p:nvPr/>
-        </p:nvSpPr>
-        <p:spPr>
-          <a:xfrm>
-            <a:off x="8450825" y="3819833"/>
-            <a:ext cx="412955" cy="383457"/>
-          </a:xfrm>
-          <a:prstGeom prst="rect">
-            <a:avLst/>
-          </a:prstGeom>
-          <a:solidFill>
-            <a:schemeClr val="bg1"/>
-          </a:solidFill>
-        </p:spPr>
-        <p:style>
-          <a:lnRef idx="2">
-            <a:schemeClr val="accent1">
-              <a:shade val="50000"/>
-            </a:schemeClr>
-          </a:lnRef>
-          <a:fillRef idx="1">
-            <a:schemeClr val="accent1"/>
-          </a:fillRef>
-          <a:effectRef idx="0">
-            <a:schemeClr val="accent1"/>
-          </a:effectRef>
-          <a:fontRef idx="minor">
-            <a:schemeClr val="lt1"/>
-          </a:fontRef>
-        </p:style>
-        <p:txBody>
-          <a:bodyPr rtlCol="0" anchor="ctr"/>
-          <a:lstStyle/>
-          <a:p>
-            <a:pPr algn="ctr"/>
-            <a:endParaRPr lang="ko-KR" altLang="en-US"/>
-          </a:p>
-        </p:txBody>
-      </p:sp>
-      <p:sp>
-        <p:nvSpPr>
-          <p:cNvPr id="10" name="직사각형 9"/>
-          <p:cNvSpPr/>
-          <p:nvPr/>
-        </p:nvSpPr>
-        <p:spPr>
-          <a:xfrm>
-            <a:off x="8495070" y="4586749"/>
-            <a:ext cx="412955" cy="383457"/>
-          </a:xfrm>
-          <a:prstGeom prst="rect">
-            <a:avLst/>
-          </a:prstGeom>
-          <a:solidFill>
-            <a:schemeClr val="bg1"/>
-          </a:solidFill>
-        </p:spPr>
-        <p:style>
-          <a:lnRef idx="2">
-            <a:schemeClr val="accent1">
-              <a:shade val="50000"/>
-            </a:schemeClr>
-          </a:lnRef>
-          <a:fillRef idx="1">
-            <a:schemeClr val="accent1"/>
-          </a:fillRef>
-          <a:effectRef idx="0">
-            <a:schemeClr val="accent1"/>
-          </a:effectRef>
-          <a:fontRef idx="minor">
-            <a:schemeClr val="lt1"/>
-          </a:fontRef>
-        </p:style>
-        <p:txBody>
-          <a:bodyPr rtlCol="0" anchor="ctr"/>
-          <a:lstStyle/>
-          <a:p>
-            <a:pPr algn="ctr"/>
-            <a:endParaRPr lang="ko-KR" altLang="en-US"/>
-          </a:p>
-        </p:txBody>
-      </p:sp>
-      <p:sp>
-        <p:nvSpPr>
-          <p:cNvPr id="11" name="직사각형 10"/>
-          <p:cNvSpPr/>
-          <p:nvPr/>
-        </p:nvSpPr>
-        <p:spPr>
-          <a:xfrm>
-            <a:off x="8495070" y="5324169"/>
-            <a:ext cx="412955" cy="383457"/>
-          </a:xfrm>
-          <a:prstGeom prst="rect">
-            <a:avLst/>
-          </a:prstGeom>
-          <a:solidFill>
-            <a:schemeClr val="bg1"/>
-          </a:solidFill>
-        </p:spPr>
-        <p:style>
-          <a:lnRef idx="2">
-            <a:schemeClr val="accent1">
-              <a:shade val="50000"/>
-            </a:schemeClr>
-          </a:lnRef>
-          <a:fillRef idx="1">
-            <a:schemeClr val="accent1"/>
-          </a:fillRef>
-          <a:effectRef idx="0">
-            <a:schemeClr val="accent1"/>
-          </a:effectRef>
-          <a:fontRef idx="minor">
-            <a:schemeClr val="lt1"/>
-          </a:fontRef>
-        </p:style>
-        <p:txBody>
-          <a:bodyPr rtlCol="0" anchor="ctr"/>
-          <a:lstStyle/>
-          <a:p>
-            <a:pPr algn="ctr"/>
-            <a:endParaRPr lang="ko-KR" altLang="en-US"/>
-          </a:p>
-        </p:txBody>
-      </p:sp>
-      <p:sp>
-        <p:nvSpPr>
-          <p:cNvPr id="12" name="직사각형 11"/>
-          <p:cNvSpPr/>
-          <p:nvPr/>
-        </p:nvSpPr>
-        <p:spPr>
-          <a:xfrm>
-            <a:off x="4385186" y="1415846"/>
-            <a:ext cx="3829665" cy="383457"/>
-          </a:xfrm>
-          <a:prstGeom prst="rect">
-            <a:avLst/>
-          </a:prstGeom>
-          <a:solidFill>
-            <a:schemeClr val="bg1"/>
-          </a:solidFill>
-        </p:spPr>
-        <p:style>
-          <a:lnRef idx="2">
-            <a:schemeClr val="accent1">
-              <a:shade val="50000"/>
-            </a:schemeClr>
-          </a:lnRef>
-          <a:fillRef idx="1">
-            <a:schemeClr val="accent1"/>
-          </a:fillRef>
-          <a:effectRef idx="0">
-            <a:schemeClr val="accent1"/>
-          </a:effectRef>
-          <a:fontRef idx="minor">
-            <a:schemeClr val="lt1"/>
-          </a:fontRef>
-        </p:style>
-        <p:txBody>
-          <a:bodyPr rtlCol="0" anchor="ctr"/>
-          <a:lstStyle/>
-          <a:p>
-            <a:pPr algn="ctr"/>
-            <a:endParaRPr lang="ko-KR" altLang="en-US"/>
-          </a:p>
-        </p:txBody>
-      </p:sp>
-      <p:sp>
-        <p:nvSpPr>
-          <p:cNvPr id="13" name="직사각형 12"/>
-          <p:cNvSpPr/>
-          <p:nvPr/>
-        </p:nvSpPr>
-        <p:spPr>
-          <a:xfrm>
-            <a:off x="4385185" y="2182762"/>
-            <a:ext cx="3829665" cy="383457"/>
-          </a:xfrm>
-          <a:prstGeom prst="rect">
-            <a:avLst/>
-          </a:prstGeom>
-          <a:solidFill>
-            <a:schemeClr val="bg1"/>
-          </a:solidFill>
-        </p:spPr>
-        <p:style>
-          <a:lnRef idx="2">
-            <a:schemeClr val="accent1">
-              <a:shade val="50000"/>
-            </a:schemeClr>
-          </a:lnRef>
-          <a:fillRef idx="1">
-            <a:schemeClr val="accent1"/>
-          </a:fillRef>
-          <a:effectRef idx="0">
-            <a:schemeClr val="accent1"/>
-          </a:effectRef>
-          <a:fontRef idx="minor">
-            <a:schemeClr val="lt1"/>
-          </a:fontRef>
-        </p:style>
-        <p:txBody>
-          <a:bodyPr rtlCol="0" anchor="ctr"/>
-          <a:lstStyle/>
-          <a:p>
-            <a:pPr algn="ctr"/>
-            <a:endParaRPr lang="ko-KR" altLang="en-US" b="1" dirty="0"/>
-          </a:p>
-        </p:txBody>
-      </p:sp>
-      <p:sp>
-        <p:nvSpPr>
-          <p:cNvPr id="14" name="직사각형 13"/>
-          <p:cNvSpPr/>
-          <p:nvPr/>
-        </p:nvSpPr>
-        <p:spPr>
-          <a:xfrm>
-            <a:off x="4468759" y="2949678"/>
-            <a:ext cx="3829665" cy="383457"/>
-          </a:xfrm>
-          <a:prstGeom prst="rect">
-            <a:avLst/>
-          </a:prstGeom>
-          <a:solidFill>
-            <a:schemeClr val="bg1"/>
-          </a:solidFill>
-        </p:spPr>
-        <p:style>
-          <a:lnRef idx="2">
-            <a:schemeClr val="accent1">
-              <a:shade val="50000"/>
-            </a:schemeClr>
-          </a:lnRef>
-          <a:fillRef idx="1">
-            <a:schemeClr val="accent1"/>
-          </a:fillRef>
-          <a:effectRef idx="0">
-            <a:schemeClr val="accent1"/>
-          </a:effectRef>
-          <a:fontRef idx="minor">
-            <a:schemeClr val="lt1"/>
-          </a:fontRef>
-        </p:style>
-        <p:txBody>
-          <a:bodyPr rtlCol="0" anchor="ctr"/>
-          <a:lstStyle/>
-          <a:p>
-            <a:pPr algn="ctr"/>
-            <a:endParaRPr lang="ko-KR" altLang="en-US" b="1" dirty="0"/>
-          </a:p>
-        </p:txBody>
-      </p:sp>
-      <p:sp>
-        <p:nvSpPr>
-          <p:cNvPr id="15" name="직사각형 14"/>
-          <p:cNvSpPr/>
-          <p:nvPr/>
-        </p:nvSpPr>
-        <p:spPr>
-          <a:xfrm>
-            <a:off x="4468759" y="3782963"/>
-            <a:ext cx="3829665" cy="383457"/>
-          </a:xfrm>
-          <a:prstGeom prst="rect">
-            <a:avLst/>
-          </a:prstGeom>
-          <a:solidFill>
-            <a:schemeClr val="bg1"/>
-          </a:solidFill>
-        </p:spPr>
-        <p:style>
-          <a:lnRef idx="2">
-            <a:schemeClr val="accent1">
-              <a:shade val="50000"/>
-            </a:schemeClr>
-          </a:lnRef>
-          <a:fillRef idx="1">
-            <a:schemeClr val="accent1"/>
-          </a:fillRef>
-          <a:effectRef idx="0">
-            <a:schemeClr val="accent1"/>
-          </a:effectRef>
-          <a:fontRef idx="minor">
-            <a:schemeClr val="lt1"/>
-          </a:fontRef>
-        </p:style>
-        <p:txBody>
-          <a:bodyPr rtlCol="0" anchor="ctr"/>
-          <a:lstStyle/>
-          <a:p>
-            <a:pPr algn="ctr"/>
-            <a:endParaRPr lang="ko-KR" altLang="en-US" b="1" dirty="0"/>
-          </a:p>
-        </p:txBody>
-      </p:sp>
-      <p:sp>
-        <p:nvSpPr>
-          <p:cNvPr id="16" name="직사각형 15"/>
-          <p:cNvSpPr/>
-          <p:nvPr/>
-        </p:nvSpPr>
-        <p:spPr>
-          <a:xfrm>
-            <a:off x="4468759" y="4616248"/>
-            <a:ext cx="3829665" cy="383457"/>
-          </a:xfrm>
-          <a:prstGeom prst="rect">
-            <a:avLst/>
-          </a:prstGeom>
-          <a:solidFill>
-            <a:schemeClr val="bg1"/>
-          </a:solidFill>
-        </p:spPr>
-        <p:style>
-          <a:lnRef idx="2">
-            <a:schemeClr val="accent1">
-              <a:shade val="50000"/>
-            </a:schemeClr>
-          </a:lnRef>
-          <a:fillRef idx="1">
-            <a:schemeClr val="accent1"/>
-          </a:fillRef>
-          <a:effectRef idx="0">
-            <a:schemeClr val="accent1"/>
-          </a:effectRef>
-          <a:fontRef idx="minor">
-            <a:schemeClr val="lt1"/>
-          </a:fontRef>
-        </p:style>
-        <p:txBody>
-          <a:bodyPr rtlCol="0" anchor="ctr"/>
-          <a:lstStyle/>
-          <a:p>
-            <a:pPr algn="ctr"/>
-            <a:endParaRPr lang="ko-KR" altLang="en-US" b="1" dirty="0"/>
-          </a:p>
-        </p:txBody>
-      </p:sp>
-      <p:sp>
-        <p:nvSpPr>
-          <p:cNvPr id="17" name="직사각형 16"/>
-          <p:cNvSpPr/>
-          <p:nvPr/>
-        </p:nvSpPr>
-        <p:spPr>
-          <a:xfrm>
-            <a:off x="4468759" y="5449533"/>
-            <a:ext cx="3829665" cy="383457"/>
-          </a:xfrm>
-          <a:prstGeom prst="rect">
-            <a:avLst/>
-          </a:prstGeom>
-          <a:solidFill>
-            <a:schemeClr val="bg1"/>
-          </a:solidFill>
-        </p:spPr>
-        <p:style>
-          <a:lnRef idx="2">
-            <a:schemeClr val="accent1">
-              <a:shade val="50000"/>
-            </a:schemeClr>
-          </a:lnRef>
-          <a:fillRef idx="1">
-            <a:schemeClr val="accent1"/>
-          </a:fillRef>
-          <a:effectRef idx="0">
-            <a:schemeClr val="accent1"/>
-          </a:effectRef>
-          <a:fontRef idx="minor">
-            <a:schemeClr val="lt1"/>
-          </a:fontRef>
-        </p:style>
-        <p:txBody>
-          <a:bodyPr rtlCol="0" anchor="ctr"/>
-          <a:lstStyle/>
-          <a:p>
-            <a:pPr algn="ctr"/>
-            <a:endParaRPr lang="ko-KR" altLang="en-US" b="1" dirty="0"/>
-          </a:p>
-        </p:txBody>
-      </p:sp>
-      <p:sp>
-        <p:nvSpPr>
-          <p:cNvPr id="21" name="TextBox 20"/>
-          <p:cNvSpPr txBox="1"/>
-          <p:nvPr/>
-        </p:nvSpPr>
-        <p:spPr>
-          <a:xfrm>
-            <a:off x="5447248" y="198793"/>
-            <a:ext cx="1420582" cy="369332"/>
-          </a:xfrm>
-          <a:prstGeom prst="rect">
-            <a:avLst/>
-          </a:prstGeom>
-          <a:noFill/>
-        </p:spPr>
-        <p:txBody>
-          <a:bodyPr wrap="none" rtlCol="0">
-            <a:spAutoFit/>
-          </a:bodyPr>
-          <a:lstStyle/>
-          <a:p>
-            <a:r>
-              <a:rPr lang="ko-KR" altLang="en-US" dirty="0" smtClean="0"/>
-              <a:t>리스트 보기</a:t>
-            </a:r>
-            <a:endParaRPr lang="en-US" altLang="ko-KR" dirty="0" smtClean="0"/>
-          </a:p>
-        </p:txBody>
-      </p:sp>
-      <p:sp>
-        <p:nvSpPr>
-          <p:cNvPr id="22" name="TextBox 21"/>
-          <p:cNvSpPr txBox="1"/>
-          <p:nvPr/>
-        </p:nvSpPr>
-        <p:spPr>
-          <a:xfrm>
-            <a:off x="6867830" y="205856"/>
-            <a:ext cx="1420582" cy="369332"/>
-          </a:xfrm>
-          <a:prstGeom prst="rect">
-            <a:avLst/>
-          </a:prstGeom>
-          <a:noFill/>
-        </p:spPr>
-        <p:txBody>
-          <a:bodyPr wrap="none" rtlCol="0">
-            <a:spAutoFit/>
-          </a:bodyPr>
-          <a:lstStyle/>
-          <a:p>
-            <a:r>
-              <a:rPr lang="ko-KR" altLang="en-US" dirty="0" smtClean="0"/>
-              <a:t>리스트 관리</a:t>
-            </a:r>
-            <a:endParaRPr lang="en-US" altLang="ko-KR" dirty="0" smtClean="0"/>
-          </a:p>
-        </p:txBody>
-      </p:sp>
-      <p:sp>
-        <p:nvSpPr>
-          <p:cNvPr id="23" name="TextBox 22"/>
-          <p:cNvSpPr txBox="1"/>
-          <p:nvPr/>
-        </p:nvSpPr>
-        <p:spPr>
-          <a:xfrm>
-            <a:off x="8288412" y="198793"/>
-            <a:ext cx="1420582" cy="369332"/>
-          </a:xfrm>
-          <a:prstGeom prst="rect">
-            <a:avLst/>
-          </a:prstGeom>
-          <a:noFill/>
-        </p:spPr>
-        <p:txBody>
-          <a:bodyPr wrap="none" rtlCol="0">
-            <a:spAutoFit/>
-          </a:bodyPr>
-          <a:lstStyle/>
-          <a:p>
-            <a:r>
-              <a:rPr lang="ko-KR" altLang="en-US" dirty="0" smtClean="0"/>
-              <a:t>리스트 </a:t>
-            </a:r>
-            <a:r>
-              <a:rPr lang="ko-KR" altLang="en-US" dirty="0" smtClean="0"/>
-              <a:t>생성</a:t>
-            </a:r>
-            <a:endParaRPr lang="en-US" altLang="ko-KR" dirty="0" smtClean="0"/>
-          </a:p>
-        </p:txBody>
-      </p:sp>
+        </p:grpSpPr>
+        <p:pic>
+          <p:nvPicPr>
+            <p:cNvPr id="4" name="그림 3"/>
+            <p:cNvPicPr>
+              <a:picLocks noChangeAspect="1"/>
+            </p:cNvPicPr>
+            <p:nvPr/>
+          </p:nvPicPr>
+          <p:blipFill rotWithShape="1">
+            <a:blip r:embed="rId2">
+              <a:extLst>
+                <a:ext uri="{28A0092B-C50C-407E-A947-70E740481C1C}">
+                  <a14:useLocalDpi xmlns:a14="http://schemas.microsoft.com/office/drawing/2010/main" val="0"/>
+                </a:ext>
+              </a:extLst>
+            </a:blip>
+            <a:srcRect l="24932" r="26797" b="53917"/>
+            <a:stretch/>
+          </p:blipFill>
+          <p:spPr>
+            <a:xfrm>
+              <a:off x="601354" y="804020"/>
+              <a:ext cx="7033160" cy="3724437"/>
+            </a:xfrm>
+            <a:prstGeom prst="rect">
+              <a:avLst/>
+            </a:prstGeom>
+          </p:spPr>
+        </p:pic>
+        <p:pic>
+          <p:nvPicPr>
+            <p:cNvPr id="5" name="그림 4"/>
+            <p:cNvPicPr>
+              <a:picLocks noChangeAspect="1"/>
+            </p:cNvPicPr>
+            <p:nvPr/>
+          </p:nvPicPr>
+          <p:blipFill rotWithShape="1">
+            <a:blip r:embed="rId2">
+              <a:extLst>
+                <a:ext uri="{28A0092B-C50C-407E-A947-70E740481C1C}">
+                  <a14:useLocalDpi xmlns:a14="http://schemas.microsoft.com/office/drawing/2010/main" val="0"/>
+                </a:ext>
+              </a:extLst>
+            </a:blip>
+            <a:srcRect l="80674" r="1" b="89206"/>
+            <a:stretch/>
+          </p:blipFill>
+          <p:spPr>
+            <a:xfrm>
+              <a:off x="5692734" y="1014479"/>
+              <a:ext cx="2815772" cy="872380"/>
+            </a:xfrm>
+            <a:prstGeom prst="rect">
+              <a:avLst/>
+            </a:prstGeom>
+          </p:spPr>
+        </p:pic>
+      </p:grpSp>
     </p:spTree>
     <p:extLst>
       <p:ext uri="{BB962C8B-B14F-4D97-AF65-F5344CB8AC3E}">
-        <p14:creationId xmlns:p14="http://schemas.microsoft.com/office/powerpoint/2010/main" val="769520728"/>
-      </p:ext>
-    </p:extLst>
-  </p:cSld>
-  <p:clrMapOvr>
-    <a:masterClrMapping/>
-  </p:clrMapOvr>
-</p:sld>
-</file>
-
-<file path=ppt/slides/slide3.xml><?xml version="1.0" encoding="utf-8"?>
-<p:sld xmlns:a="http://schemas.openxmlformats.org/drawingml/2006/main" xmlns:r="http://schemas.openxmlformats.org/officeDocument/2006/relationships" xmlns:p="http://schemas.openxmlformats.org/presentationml/2006/main">
-  <p:cSld>
-    <p:spTree>
-      <p:nvGrpSpPr>
-        <p:cNvPr id="1" name=""/>
-        <p:cNvGrpSpPr/>
-        <p:nvPr/>
-      </p:nvGrpSpPr>
-      <p:grpSpPr>
-        <a:xfrm>
-          <a:off x="0" y="0"/>
-          <a:ext cx="0" cy="0"/>
-          <a:chOff x="0" y="0"/>
-          <a:chExt cx="0" cy="0"/>
-        </a:xfrm>
-      </p:grpSpPr>
-      <p:sp>
-        <p:nvSpPr>
-          <p:cNvPr id="4" name="직사각형 3"/>
-          <p:cNvSpPr/>
-          <p:nvPr/>
-        </p:nvSpPr>
-        <p:spPr>
-          <a:xfrm>
-            <a:off x="3067664" y="0"/>
-            <a:ext cx="6754762" cy="707923"/>
-          </a:xfrm>
-          <a:prstGeom prst="rect">
-            <a:avLst/>
-          </a:prstGeom>
-          <a:solidFill>
-            <a:schemeClr val="accent6"/>
-          </a:solidFill>
-        </p:spPr>
-        <p:style>
-          <a:lnRef idx="2">
-            <a:schemeClr val="accent1">
-              <a:shade val="50000"/>
-            </a:schemeClr>
-          </a:lnRef>
-          <a:fillRef idx="1">
-            <a:schemeClr val="accent1"/>
-          </a:fillRef>
-          <a:effectRef idx="0">
-            <a:schemeClr val="accent1"/>
-          </a:effectRef>
-          <a:fontRef idx="minor">
-            <a:schemeClr val="lt1"/>
-          </a:fontRef>
-        </p:style>
-        <p:txBody>
-          <a:bodyPr rtlCol="0" anchor="ctr"/>
-          <a:lstStyle/>
-          <a:p>
-            <a:pPr algn="ctr"/>
-            <a:endParaRPr lang="ko-KR" altLang="en-US" dirty="0"/>
-          </a:p>
-        </p:txBody>
-      </p:sp>
-      <p:sp>
-        <p:nvSpPr>
-          <p:cNvPr id="5" name="직사각형 4"/>
-          <p:cNvSpPr/>
-          <p:nvPr/>
-        </p:nvSpPr>
-        <p:spPr>
-          <a:xfrm>
-            <a:off x="3067664" y="707923"/>
-            <a:ext cx="6754762" cy="6150077"/>
-          </a:xfrm>
-          <a:prstGeom prst="rect">
-            <a:avLst/>
-          </a:prstGeom>
-          <a:solidFill>
-            <a:schemeClr val="accent6">
-              <a:lumMod val="20000"/>
-              <a:lumOff val="80000"/>
-            </a:schemeClr>
-          </a:solidFill>
-        </p:spPr>
-        <p:style>
-          <a:lnRef idx="2">
-            <a:schemeClr val="accent1">
-              <a:shade val="50000"/>
-            </a:schemeClr>
-          </a:lnRef>
-          <a:fillRef idx="1">
-            <a:schemeClr val="accent1"/>
-          </a:fillRef>
-          <a:effectRef idx="0">
-            <a:schemeClr val="accent1"/>
-          </a:effectRef>
-          <a:fontRef idx="minor">
-            <a:schemeClr val="lt1"/>
-          </a:fontRef>
-        </p:style>
-        <p:txBody>
-          <a:bodyPr rtlCol="0" anchor="ctr"/>
-          <a:lstStyle/>
-          <a:p>
-            <a:pPr algn="ctr"/>
-            <a:endParaRPr lang="ko-KR" altLang="en-US"/>
-          </a:p>
-        </p:txBody>
-      </p:sp>
-      <p:sp>
-        <p:nvSpPr>
-          <p:cNvPr id="7" name="직사각형 6"/>
-          <p:cNvSpPr/>
-          <p:nvPr/>
-        </p:nvSpPr>
-        <p:spPr>
-          <a:xfrm>
-            <a:off x="0" y="0"/>
-            <a:ext cx="2168013" cy="707923"/>
-          </a:xfrm>
-          <a:prstGeom prst="rect">
-            <a:avLst/>
-          </a:prstGeom>
-        </p:spPr>
-        <p:style>
-          <a:lnRef idx="2">
-            <a:schemeClr val="accent1">
-              <a:shade val="50000"/>
-            </a:schemeClr>
-          </a:lnRef>
-          <a:fillRef idx="1">
-            <a:schemeClr val="accent1"/>
-          </a:fillRef>
-          <a:effectRef idx="0">
-            <a:schemeClr val="accent1"/>
-          </a:effectRef>
-          <a:fontRef idx="minor">
-            <a:schemeClr val="lt1"/>
-          </a:fontRef>
-        </p:style>
-        <p:txBody>
-          <a:bodyPr rtlCol="0" anchor="ctr"/>
-          <a:lstStyle/>
-          <a:p>
-            <a:pPr algn="ctr"/>
-            <a:r>
-              <a:rPr lang="ko-KR" altLang="en-US" dirty="0" smtClean="0"/>
-              <a:t>리스트 관리</a:t>
-            </a:r>
-            <a:endParaRPr lang="en-US" altLang="ko-KR" dirty="0" smtClean="0"/>
-          </a:p>
-        </p:txBody>
-      </p:sp>
-      <p:sp>
-        <p:nvSpPr>
-          <p:cNvPr id="2" name="직사각형 1"/>
-          <p:cNvSpPr/>
-          <p:nvPr/>
-        </p:nvSpPr>
-        <p:spPr>
-          <a:xfrm>
-            <a:off x="4417141" y="1415846"/>
-            <a:ext cx="412955" cy="383457"/>
-          </a:xfrm>
-          <a:prstGeom prst="rect">
-            <a:avLst/>
-          </a:prstGeom>
-          <a:solidFill>
-            <a:schemeClr val="bg1"/>
-          </a:solidFill>
-        </p:spPr>
-        <p:style>
-          <a:lnRef idx="2">
-            <a:schemeClr val="accent1">
-              <a:shade val="50000"/>
-            </a:schemeClr>
-          </a:lnRef>
-          <a:fillRef idx="1">
-            <a:schemeClr val="accent1"/>
-          </a:fillRef>
-          <a:effectRef idx="0">
-            <a:schemeClr val="accent1"/>
-          </a:effectRef>
-          <a:fontRef idx="minor">
-            <a:schemeClr val="lt1"/>
-          </a:fontRef>
-        </p:style>
-        <p:txBody>
-          <a:bodyPr rtlCol="0" anchor="ctr"/>
-          <a:lstStyle/>
-          <a:p>
-            <a:pPr algn="ctr"/>
-            <a:r>
-              <a:rPr lang="ko-KR" altLang="en-US" dirty="0" smtClean="0">
-                <a:solidFill>
-                  <a:srgbClr val="FF0000"/>
-                </a:solidFill>
-              </a:rPr>
-              <a:t>삭제</a:t>
-            </a:r>
-            <a:endParaRPr lang="ko-KR" altLang="en-US" dirty="0">
-              <a:solidFill>
-                <a:srgbClr val="FF0000"/>
-              </a:solidFill>
-            </a:endParaRPr>
-          </a:p>
-        </p:txBody>
-      </p:sp>
-      <p:sp>
-        <p:nvSpPr>
-          <p:cNvPr id="12" name="직사각형 11"/>
-          <p:cNvSpPr/>
-          <p:nvPr/>
-        </p:nvSpPr>
-        <p:spPr>
-          <a:xfrm>
-            <a:off x="5078360" y="1415846"/>
-            <a:ext cx="3829665" cy="383457"/>
-          </a:xfrm>
-          <a:prstGeom prst="rect">
-            <a:avLst/>
-          </a:prstGeom>
-          <a:solidFill>
-            <a:schemeClr val="bg1"/>
-          </a:solidFill>
-        </p:spPr>
-        <p:style>
-          <a:lnRef idx="2">
-            <a:schemeClr val="accent1">
-              <a:shade val="50000"/>
-            </a:schemeClr>
-          </a:lnRef>
-          <a:fillRef idx="1">
-            <a:schemeClr val="accent1"/>
-          </a:fillRef>
-          <a:effectRef idx="0">
-            <a:schemeClr val="accent1"/>
-          </a:effectRef>
-          <a:fontRef idx="minor">
-            <a:schemeClr val="lt1"/>
-          </a:fontRef>
-        </p:style>
-        <p:txBody>
-          <a:bodyPr rtlCol="0" anchor="ctr"/>
-          <a:lstStyle/>
-          <a:p>
-            <a:pPr algn="ctr"/>
-            <a:endParaRPr lang="ko-KR" altLang="en-US"/>
-          </a:p>
-        </p:txBody>
-      </p:sp>
-      <p:sp>
-        <p:nvSpPr>
-          <p:cNvPr id="21" name="직사각형 20"/>
-          <p:cNvSpPr/>
-          <p:nvPr/>
-        </p:nvSpPr>
-        <p:spPr>
-          <a:xfrm>
-            <a:off x="3760838" y="1415846"/>
-            <a:ext cx="412955" cy="383457"/>
-          </a:xfrm>
-          <a:prstGeom prst="rect">
-            <a:avLst/>
-          </a:prstGeom>
-          <a:solidFill>
-            <a:schemeClr val="bg1"/>
-          </a:solidFill>
-        </p:spPr>
-        <p:style>
-          <a:lnRef idx="2">
-            <a:schemeClr val="accent1">
-              <a:shade val="50000"/>
-            </a:schemeClr>
-          </a:lnRef>
-          <a:fillRef idx="1">
-            <a:schemeClr val="accent1"/>
-          </a:fillRef>
-          <a:effectRef idx="0">
-            <a:schemeClr val="accent1"/>
-          </a:effectRef>
-          <a:fontRef idx="minor">
-            <a:schemeClr val="lt1"/>
-          </a:fontRef>
-        </p:style>
-        <p:txBody>
-          <a:bodyPr rtlCol="0" anchor="ctr"/>
-          <a:lstStyle/>
-          <a:p>
-            <a:pPr algn="ctr"/>
-            <a:r>
-              <a:rPr lang="ko-KR" altLang="en-US" dirty="0" smtClean="0">
-                <a:solidFill>
-                  <a:srgbClr val="FF0000"/>
-                </a:solidFill>
-              </a:rPr>
-              <a:t>수정</a:t>
-            </a:r>
-            <a:endParaRPr lang="ko-KR" altLang="en-US" dirty="0">
-              <a:solidFill>
-                <a:srgbClr val="FF0000"/>
-              </a:solidFill>
-            </a:endParaRPr>
-          </a:p>
-        </p:txBody>
-      </p:sp>
-      <p:sp>
-        <p:nvSpPr>
-          <p:cNvPr id="25" name="직사각형 24"/>
-          <p:cNvSpPr/>
-          <p:nvPr/>
-        </p:nvSpPr>
-        <p:spPr>
-          <a:xfrm>
-            <a:off x="4417141" y="2153266"/>
-            <a:ext cx="412955" cy="383457"/>
-          </a:xfrm>
-          <a:prstGeom prst="rect">
-            <a:avLst/>
-          </a:prstGeom>
-          <a:solidFill>
-            <a:schemeClr val="bg1"/>
-          </a:solidFill>
-        </p:spPr>
-        <p:style>
-          <a:lnRef idx="2">
-            <a:schemeClr val="accent1">
-              <a:shade val="50000"/>
-            </a:schemeClr>
-          </a:lnRef>
-          <a:fillRef idx="1">
-            <a:schemeClr val="accent1"/>
-          </a:fillRef>
-          <a:effectRef idx="0">
-            <a:schemeClr val="accent1"/>
-          </a:effectRef>
-          <a:fontRef idx="minor">
-            <a:schemeClr val="lt1"/>
-          </a:fontRef>
-        </p:style>
-        <p:txBody>
-          <a:bodyPr rtlCol="0" anchor="ctr"/>
-          <a:lstStyle/>
-          <a:p>
-            <a:pPr algn="ctr"/>
-            <a:endParaRPr lang="ko-KR" altLang="en-US"/>
-          </a:p>
-        </p:txBody>
-      </p:sp>
-      <p:sp>
-        <p:nvSpPr>
-          <p:cNvPr id="26" name="직사각형 25"/>
-          <p:cNvSpPr/>
-          <p:nvPr/>
-        </p:nvSpPr>
-        <p:spPr>
-          <a:xfrm>
-            <a:off x="5078360" y="2153266"/>
-            <a:ext cx="3829665" cy="383457"/>
-          </a:xfrm>
-          <a:prstGeom prst="rect">
-            <a:avLst/>
-          </a:prstGeom>
-          <a:solidFill>
-            <a:schemeClr val="bg1"/>
-          </a:solidFill>
-        </p:spPr>
-        <p:style>
-          <a:lnRef idx="2">
-            <a:schemeClr val="accent1">
-              <a:shade val="50000"/>
-            </a:schemeClr>
-          </a:lnRef>
-          <a:fillRef idx="1">
-            <a:schemeClr val="accent1"/>
-          </a:fillRef>
-          <a:effectRef idx="0">
-            <a:schemeClr val="accent1"/>
-          </a:effectRef>
-          <a:fontRef idx="minor">
-            <a:schemeClr val="lt1"/>
-          </a:fontRef>
-        </p:style>
-        <p:txBody>
-          <a:bodyPr rtlCol="0" anchor="ctr"/>
-          <a:lstStyle/>
-          <a:p>
-            <a:pPr algn="ctr"/>
-            <a:endParaRPr lang="ko-KR" altLang="en-US"/>
-          </a:p>
-        </p:txBody>
-      </p:sp>
-      <p:sp>
-        <p:nvSpPr>
-          <p:cNvPr id="27" name="직사각형 26"/>
-          <p:cNvSpPr/>
-          <p:nvPr/>
-        </p:nvSpPr>
-        <p:spPr>
-          <a:xfrm>
-            <a:off x="3760838" y="2153266"/>
-            <a:ext cx="412955" cy="383457"/>
-          </a:xfrm>
-          <a:prstGeom prst="rect">
-            <a:avLst/>
-          </a:prstGeom>
-          <a:solidFill>
-            <a:schemeClr val="bg1"/>
-          </a:solidFill>
-        </p:spPr>
-        <p:style>
-          <a:lnRef idx="2">
-            <a:schemeClr val="accent1">
-              <a:shade val="50000"/>
-            </a:schemeClr>
-          </a:lnRef>
-          <a:fillRef idx="1">
-            <a:schemeClr val="accent1"/>
-          </a:fillRef>
-          <a:effectRef idx="0">
-            <a:schemeClr val="accent1"/>
-          </a:effectRef>
-          <a:fontRef idx="minor">
-            <a:schemeClr val="lt1"/>
-          </a:fontRef>
-        </p:style>
-        <p:txBody>
-          <a:bodyPr rtlCol="0" anchor="ctr"/>
-          <a:lstStyle/>
-          <a:p>
-            <a:pPr algn="ctr"/>
-            <a:endParaRPr lang="ko-KR" altLang="en-US"/>
-          </a:p>
-        </p:txBody>
-      </p:sp>
-      <p:sp>
-        <p:nvSpPr>
-          <p:cNvPr id="28" name="직사각형 27"/>
-          <p:cNvSpPr/>
-          <p:nvPr/>
-        </p:nvSpPr>
-        <p:spPr>
-          <a:xfrm>
-            <a:off x="4417141" y="2859346"/>
-            <a:ext cx="412955" cy="383457"/>
-          </a:xfrm>
-          <a:prstGeom prst="rect">
-            <a:avLst/>
-          </a:prstGeom>
-          <a:solidFill>
-            <a:schemeClr val="bg1"/>
-          </a:solidFill>
-        </p:spPr>
-        <p:style>
-          <a:lnRef idx="2">
-            <a:schemeClr val="accent1">
-              <a:shade val="50000"/>
-            </a:schemeClr>
-          </a:lnRef>
-          <a:fillRef idx="1">
-            <a:schemeClr val="accent1"/>
-          </a:fillRef>
-          <a:effectRef idx="0">
-            <a:schemeClr val="accent1"/>
-          </a:effectRef>
-          <a:fontRef idx="minor">
-            <a:schemeClr val="lt1"/>
-          </a:fontRef>
-        </p:style>
-        <p:txBody>
-          <a:bodyPr rtlCol="0" anchor="ctr"/>
-          <a:lstStyle/>
-          <a:p>
-            <a:pPr algn="ctr"/>
-            <a:endParaRPr lang="ko-KR" altLang="en-US"/>
-          </a:p>
-        </p:txBody>
-      </p:sp>
-      <p:sp>
-        <p:nvSpPr>
-          <p:cNvPr id="29" name="직사각형 28"/>
-          <p:cNvSpPr/>
-          <p:nvPr/>
-        </p:nvSpPr>
-        <p:spPr>
-          <a:xfrm>
-            <a:off x="5078360" y="2859346"/>
-            <a:ext cx="3829665" cy="383457"/>
-          </a:xfrm>
-          <a:prstGeom prst="rect">
-            <a:avLst/>
-          </a:prstGeom>
-          <a:solidFill>
-            <a:schemeClr val="bg1"/>
-          </a:solidFill>
-        </p:spPr>
-        <p:style>
-          <a:lnRef idx="2">
-            <a:schemeClr val="accent1">
-              <a:shade val="50000"/>
-            </a:schemeClr>
-          </a:lnRef>
-          <a:fillRef idx="1">
-            <a:schemeClr val="accent1"/>
-          </a:fillRef>
-          <a:effectRef idx="0">
-            <a:schemeClr val="accent1"/>
-          </a:effectRef>
-          <a:fontRef idx="minor">
-            <a:schemeClr val="lt1"/>
-          </a:fontRef>
-        </p:style>
-        <p:txBody>
-          <a:bodyPr rtlCol="0" anchor="ctr"/>
-          <a:lstStyle/>
-          <a:p>
-            <a:pPr algn="ctr"/>
-            <a:endParaRPr lang="ko-KR" altLang="en-US"/>
-          </a:p>
-        </p:txBody>
-      </p:sp>
-      <p:sp>
-        <p:nvSpPr>
-          <p:cNvPr id="30" name="직사각형 29"/>
-          <p:cNvSpPr/>
-          <p:nvPr/>
-        </p:nvSpPr>
-        <p:spPr>
-          <a:xfrm>
-            <a:off x="3760838" y="2859346"/>
-            <a:ext cx="412955" cy="383457"/>
-          </a:xfrm>
-          <a:prstGeom prst="rect">
-            <a:avLst/>
-          </a:prstGeom>
-          <a:solidFill>
-            <a:schemeClr val="bg1"/>
-          </a:solidFill>
-        </p:spPr>
-        <p:style>
-          <a:lnRef idx="2">
-            <a:schemeClr val="accent1">
-              <a:shade val="50000"/>
-            </a:schemeClr>
-          </a:lnRef>
-          <a:fillRef idx="1">
-            <a:schemeClr val="accent1"/>
-          </a:fillRef>
-          <a:effectRef idx="0">
-            <a:schemeClr val="accent1"/>
-          </a:effectRef>
-          <a:fontRef idx="minor">
-            <a:schemeClr val="lt1"/>
-          </a:fontRef>
-        </p:style>
-        <p:txBody>
-          <a:bodyPr rtlCol="0" anchor="ctr"/>
-          <a:lstStyle/>
-          <a:p>
-            <a:pPr algn="ctr"/>
-            <a:endParaRPr lang="ko-KR" altLang="en-US"/>
-          </a:p>
-        </p:txBody>
-      </p:sp>
-      <p:sp>
-        <p:nvSpPr>
-          <p:cNvPr id="31" name="직사각형 30"/>
-          <p:cNvSpPr/>
-          <p:nvPr/>
-        </p:nvSpPr>
-        <p:spPr>
-          <a:xfrm>
-            <a:off x="4417141" y="3565426"/>
-            <a:ext cx="412955" cy="383457"/>
-          </a:xfrm>
-          <a:prstGeom prst="rect">
-            <a:avLst/>
-          </a:prstGeom>
-          <a:solidFill>
-            <a:schemeClr val="bg1"/>
-          </a:solidFill>
-        </p:spPr>
-        <p:style>
-          <a:lnRef idx="2">
-            <a:schemeClr val="accent1">
-              <a:shade val="50000"/>
-            </a:schemeClr>
-          </a:lnRef>
-          <a:fillRef idx="1">
-            <a:schemeClr val="accent1"/>
-          </a:fillRef>
-          <a:effectRef idx="0">
-            <a:schemeClr val="accent1"/>
-          </a:effectRef>
-          <a:fontRef idx="minor">
-            <a:schemeClr val="lt1"/>
-          </a:fontRef>
-        </p:style>
-        <p:txBody>
-          <a:bodyPr rtlCol="0" anchor="ctr"/>
-          <a:lstStyle/>
-          <a:p>
-            <a:pPr algn="ctr"/>
-            <a:endParaRPr lang="ko-KR" altLang="en-US"/>
-          </a:p>
-        </p:txBody>
-      </p:sp>
-      <p:sp>
-        <p:nvSpPr>
-          <p:cNvPr id="32" name="직사각형 31"/>
-          <p:cNvSpPr/>
-          <p:nvPr/>
-        </p:nvSpPr>
-        <p:spPr>
-          <a:xfrm>
-            <a:off x="5078360" y="3565426"/>
-            <a:ext cx="3829665" cy="383457"/>
-          </a:xfrm>
-          <a:prstGeom prst="rect">
-            <a:avLst/>
-          </a:prstGeom>
-          <a:solidFill>
-            <a:schemeClr val="bg1"/>
-          </a:solidFill>
-        </p:spPr>
-        <p:style>
-          <a:lnRef idx="2">
-            <a:schemeClr val="accent1">
-              <a:shade val="50000"/>
-            </a:schemeClr>
-          </a:lnRef>
-          <a:fillRef idx="1">
-            <a:schemeClr val="accent1"/>
-          </a:fillRef>
-          <a:effectRef idx="0">
-            <a:schemeClr val="accent1"/>
-          </a:effectRef>
-          <a:fontRef idx="minor">
-            <a:schemeClr val="lt1"/>
-          </a:fontRef>
-        </p:style>
-        <p:txBody>
-          <a:bodyPr rtlCol="0" anchor="ctr"/>
-          <a:lstStyle/>
-          <a:p>
-            <a:pPr algn="ctr"/>
-            <a:endParaRPr lang="ko-KR" altLang="en-US"/>
-          </a:p>
-        </p:txBody>
-      </p:sp>
-      <p:sp>
-        <p:nvSpPr>
-          <p:cNvPr id="33" name="직사각형 32"/>
-          <p:cNvSpPr/>
-          <p:nvPr/>
-        </p:nvSpPr>
-        <p:spPr>
-          <a:xfrm>
-            <a:off x="3760838" y="3565426"/>
-            <a:ext cx="412955" cy="383457"/>
-          </a:xfrm>
-          <a:prstGeom prst="rect">
-            <a:avLst/>
-          </a:prstGeom>
-          <a:solidFill>
-            <a:schemeClr val="bg1"/>
-          </a:solidFill>
-        </p:spPr>
-        <p:style>
-          <a:lnRef idx="2">
-            <a:schemeClr val="accent1">
-              <a:shade val="50000"/>
-            </a:schemeClr>
-          </a:lnRef>
-          <a:fillRef idx="1">
-            <a:schemeClr val="accent1"/>
-          </a:fillRef>
-          <a:effectRef idx="0">
-            <a:schemeClr val="accent1"/>
-          </a:effectRef>
-          <a:fontRef idx="minor">
-            <a:schemeClr val="lt1"/>
-          </a:fontRef>
-        </p:style>
-        <p:txBody>
-          <a:bodyPr rtlCol="0" anchor="ctr"/>
-          <a:lstStyle/>
-          <a:p>
-            <a:pPr algn="ctr"/>
-            <a:endParaRPr lang="ko-KR" altLang="en-US"/>
-          </a:p>
-        </p:txBody>
-      </p:sp>
-      <p:sp>
-        <p:nvSpPr>
-          <p:cNvPr id="34" name="직사각형 33"/>
-          <p:cNvSpPr/>
-          <p:nvPr/>
-        </p:nvSpPr>
-        <p:spPr>
-          <a:xfrm>
-            <a:off x="4417141" y="4271506"/>
-            <a:ext cx="412955" cy="383457"/>
-          </a:xfrm>
-          <a:prstGeom prst="rect">
-            <a:avLst/>
-          </a:prstGeom>
-          <a:solidFill>
-            <a:schemeClr val="bg1"/>
-          </a:solidFill>
-        </p:spPr>
-        <p:style>
-          <a:lnRef idx="2">
-            <a:schemeClr val="accent1">
-              <a:shade val="50000"/>
-            </a:schemeClr>
-          </a:lnRef>
-          <a:fillRef idx="1">
-            <a:schemeClr val="accent1"/>
-          </a:fillRef>
-          <a:effectRef idx="0">
-            <a:schemeClr val="accent1"/>
-          </a:effectRef>
-          <a:fontRef idx="minor">
-            <a:schemeClr val="lt1"/>
-          </a:fontRef>
-        </p:style>
-        <p:txBody>
-          <a:bodyPr rtlCol="0" anchor="ctr"/>
-          <a:lstStyle/>
-          <a:p>
-            <a:pPr algn="ctr"/>
-            <a:endParaRPr lang="ko-KR" altLang="en-US"/>
-          </a:p>
-        </p:txBody>
-      </p:sp>
-      <p:sp>
-        <p:nvSpPr>
-          <p:cNvPr id="35" name="직사각형 34"/>
-          <p:cNvSpPr/>
-          <p:nvPr/>
-        </p:nvSpPr>
-        <p:spPr>
-          <a:xfrm>
-            <a:off x="5078360" y="4271506"/>
-            <a:ext cx="3829665" cy="383457"/>
-          </a:xfrm>
-          <a:prstGeom prst="rect">
-            <a:avLst/>
-          </a:prstGeom>
-          <a:solidFill>
-            <a:schemeClr val="bg1"/>
-          </a:solidFill>
-        </p:spPr>
-        <p:style>
-          <a:lnRef idx="2">
-            <a:schemeClr val="accent1">
-              <a:shade val="50000"/>
-            </a:schemeClr>
-          </a:lnRef>
-          <a:fillRef idx="1">
-            <a:schemeClr val="accent1"/>
-          </a:fillRef>
-          <a:effectRef idx="0">
-            <a:schemeClr val="accent1"/>
-          </a:effectRef>
-          <a:fontRef idx="minor">
-            <a:schemeClr val="lt1"/>
-          </a:fontRef>
-        </p:style>
-        <p:txBody>
-          <a:bodyPr rtlCol="0" anchor="ctr"/>
-          <a:lstStyle/>
-          <a:p>
-            <a:pPr algn="ctr"/>
-            <a:endParaRPr lang="ko-KR" altLang="en-US"/>
-          </a:p>
-        </p:txBody>
-      </p:sp>
-      <p:sp>
-        <p:nvSpPr>
-          <p:cNvPr id="36" name="직사각형 35"/>
-          <p:cNvSpPr/>
-          <p:nvPr/>
-        </p:nvSpPr>
-        <p:spPr>
-          <a:xfrm>
-            <a:off x="3760838" y="4271506"/>
-            <a:ext cx="412955" cy="383457"/>
-          </a:xfrm>
-          <a:prstGeom prst="rect">
-            <a:avLst/>
-          </a:prstGeom>
-          <a:solidFill>
-            <a:schemeClr val="bg1"/>
-          </a:solidFill>
-        </p:spPr>
-        <p:style>
-          <a:lnRef idx="2">
-            <a:schemeClr val="accent1">
-              <a:shade val="50000"/>
-            </a:schemeClr>
-          </a:lnRef>
-          <a:fillRef idx="1">
-            <a:schemeClr val="accent1"/>
-          </a:fillRef>
-          <a:effectRef idx="0">
-            <a:schemeClr val="accent1"/>
-          </a:effectRef>
-          <a:fontRef idx="minor">
-            <a:schemeClr val="lt1"/>
-          </a:fontRef>
-        </p:style>
-        <p:txBody>
-          <a:bodyPr rtlCol="0" anchor="ctr"/>
-          <a:lstStyle/>
-          <a:p>
-            <a:pPr algn="ctr"/>
-            <a:endParaRPr lang="ko-KR" altLang="en-US"/>
-          </a:p>
-        </p:txBody>
-      </p:sp>
-      <p:sp>
-        <p:nvSpPr>
-          <p:cNvPr id="37" name="직사각형 36"/>
-          <p:cNvSpPr/>
-          <p:nvPr/>
-        </p:nvSpPr>
-        <p:spPr>
-          <a:xfrm>
-            <a:off x="4417141" y="4977586"/>
-            <a:ext cx="412955" cy="383457"/>
-          </a:xfrm>
-          <a:prstGeom prst="rect">
-            <a:avLst/>
-          </a:prstGeom>
-          <a:solidFill>
-            <a:schemeClr val="bg1"/>
-          </a:solidFill>
-        </p:spPr>
-        <p:style>
-          <a:lnRef idx="2">
-            <a:schemeClr val="accent1">
-              <a:shade val="50000"/>
-            </a:schemeClr>
-          </a:lnRef>
-          <a:fillRef idx="1">
-            <a:schemeClr val="accent1"/>
-          </a:fillRef>
-          <a:effectRef idx="0">
-            <a:schemeClr val="accent1"/>
-          </a:effectRef>
-          <a:fontRef idx="minor">
-            <a:schemeClr val="lt1"/>
-          </a:fontRef>
-        </p:style>
-        <p:txBody>
-          <a:bodyPr rtlCol="0" anchor="ctr"/>
-          <a:lstStyle/>
-          <a:p>
-            <a:pPr algn="ctr"/>
-            <a:endParaRPr lang="ko-KR" altLang="en-US"/>
-          </a:p>
-        </p:txBody>
-      </p:sp>
-      <p:sp>
-        <p:nvSpPr>
-          <p:cNvPr id="38" name="직사각형 37"/>
-          <p:cNvSpPr/>
-          <p:nvPr/>
-        </p:nvSpPr>
-        <p:spPr>
-          <a:xfrm>
-            <a:off x="5078360" y="4977586"/>
-            <a:ext cx="3829665" cy="383457"/>
-          </a:xfrm>
-          <a:prstGeom prst="rect">
-            <a:avLst/>
-          </a:prstGeom>
-          <a:solidFill>
-            <a:schemeClr val="bg1"/>
-          </a:solidFill>
-        </p:spPr>
-        <p:style>
-          <a:lnRef idx="2">
-            <a:schemeClr val="accent1">
-              <a:shade val="50000"/>
-            </a:schemeClr>
-          </a:lnRef>
-          <a:fillRef idx="1">
-            <a:schemeClr val="accent1"/>
-          </a:fillRef>
-          <a:effectRef idx="0">
-            <a:schemeClr val="accent1"/>
-          </a:effectRef>
-          <a:fontRef idx="minor">
-            <a:schemeClr val="lt1"/>
-          </a:fontRef>
-        </p:style>
-        <p:txBody>
-          <a:bodyPr rtlCol="0" anchor="ctr"/>
-          <a:lstStyle/>
-          <a:p>
-            <a:pPr algn="ctr"/>
-            <a:endParaRPr lang="ko-KR" altLang="en-US"/>
-          </a:p>
-        </p:txBody>
-      </p:sp>
-      <p:sp>
-        <p:nvSpPr>
-          <p:cNvPr id="39" name="직사각형 38"/>
-          <p:cNvSpPr/>
-          <p:nvPr/>
-        </p:nvSpPr>
-        <p:spPr>
-          <a:xfrm>
-            <a:off x="3760838" y="4977586"/>
-            <a:ext cx="412955" cy="383457"/>
-          </a:xfrm>
-          <a:prstGeom prst="rect">
-            <a:avLst/>
-          </a:prstGeom>
-          <a:solidFill>
-            <a:schemeClr val="bg1"/>
-          </a:solidFill>
-        </p:spPr>
-        <p:style>
-          <a:lnRef idx="2">
-            <a:schemeClr val="accent1">
-              <a:shade val="50000"/>
-            </a:schemeClr>
-          </a:lnRef>
-          <a:fillRef idx="1">
-            <a:schemeClr val="accent1"/>
-          </a:fillRef>
-          <a:effectRef idx="0">
-            <a:schemeClr val="accent1"/>
-          </a:effectRef>
-          <a:fontRef idx="minor">
-            <a:schemeClr val="lt1"/>
-          </a:fontRef>
-        </p:style>
-        <p:txBody>
-          <a:bodyPr rtlCol="0" anchor="ctr"/>
-          <a:lstStyle/>
-          <a:p>
-            <a:pPr algn="ctr"/>
-            <a:endParaRPr lang="ko-KR" altLang="en-US"/>
-          </a:p>
-        </p:txBody>
-      </p:sp>
-      <p:sp>
-        <p:nvSpPr>
-          <p:cNvPr id="43" name="TextBox 42"/>
-          <p:cNvSpPr txBox="1"/>
-          <p:nvPr/>
-        </p:nvSpPr>
-        <p:spPr>
-          <a:xfrm>
-            <a:off x="5447248" y="198793"/>
-            <a:ext cx="1420582" cy="369332"/>
-          </a:xfrm>
-          <a:prstGeom prst="rect">
-            <a:avLst/>
-          </a:prstGeom>
-          <a:noFill/>
-        </p:spPr>
-        <p:txBody>
-          <a:bodyPr wrap="none" rtlCol="0">
-            <a:spAutoFit/>
-          </a:bodyPr>
-          <a:lstStyle/>
-          <a:p>
-            <a:r>
-              <a:rPr lang="ko-KR" altLang="en-US" dirty="0" smtClean="0"/>
-              <a:t>리스트 보기</a:t>
-            </a:r>
-            <a:endParaRPr lang="en-US" altLang="ko-KR" dirty="0" smtClean="0"/>
-          </a:p>
-        </p:txBody>
-      </p:sp>
-      <p:sp>
-        <p:nvSpPr>
-          <p:cNvPr id="44" name="TextBox 43"/>
-          <p:cNvSpPr txBox="1"/>
-          <p:nvPr/>
-        </p:nvSpPr>
-        <p:spPr>
-          <a:xfrm>
-            <a:off x="6867830" y="205856"/>
-            <a:ext cx="1420582" cy="369332"/>
-          </a:xfrm>
-          <a:prstGeom prst="rect">
-            <a:avLst/>
-          </a:prstGeom>
-          <a:noFill/>
-        </p:spPr>
-        <p:txBody>
-          <a:bodyPr wrap="none" rtlCol="0">
-            <a:spAutoFit/>
-          </a:bodyPr>
-          <a:lstStyle/>
-          <a:p>
-            <a:r>
-              <a:rPr lang="ko-KR" altLang="en-US" dirty="0" smtClean="0"/>
-              <a:t>리스트 관리</a:t>
-            </a:r>
-            <a:endParaRPr lang="en-US" altLang="ko-KR" dirty="0" smtClean="0"/>
-          </a:p>
-        </p:txBody>
-      </p:sp>
-      <p:sp>
-        <p:nvSpPr>
-          <p:cNvPr id="45" name="TextBox 44"/>
-          <p:cNvSpPr txBox="1"/>
-          <p:nvPr/>
-        </p:nvSpPr>
-        <p:spPr>
-          <a:xfrm>
-            <a:off x="8288412" y="198793"/>
-            <a:ext cx="1420582" cy="369332"/>
-          </a:xfrm>
-          <a:prstGeom prst="rect">
-            <a:avLst/>
-          </a:prstGeom>
-          <a:noFill/>
-        </p:spPr>
-        <p:txBody>
-          <a:bodyPr wrap="none" rtlCol="0">
-            <a:spAutoFit/>
-          </a:bodyPr>
-          <a:lstStyle/>
-          <a:p>
-            <a:r>
-              <a:rPr lang="ko-KR" altLang="en-US" dirty="0" smtClean="0"/>
-              <a:t>리스트 </a:t>
-            </a:r>
-            <a:r>
-              <a:rPr lang="ko-KR" altLang="en-US" dirty="0" smtClean="0"/>
-              <a:t>생성</a:t>
-            </a:r>
-            <a:endParaRPr lang="en-US" altLang="ko-KR" dirty="0" smtClean="0"/>
-          </a:p>
-        </p:txBody>
-      </p:sp>
-    </p:spTree>
-    <p:extLst>
-      <p:ext uri="{BB962C8B-B14F-4D97-AF65-F5344CB8AC3E}">
-        <p14:creationId xmlns:p14="http://schemas.microsoft.com/office/powerpoint/2010/main" val="1525370259"/>
-      </p:ext>
-    </p:extLst>
-  </p:cSld>
-  <p:clrMapOvr>
-    <a:masterClrMapping/>
-  </p:clrMapOvr>
-</p:sld>
-</file>
-
-<file path=ppt/slides/slide4.xml><?xml version="1.0" encoding="utf-8"?>
-<p:sld xmlns:a="http://schemas.openxmlformats.org/drawingml/2006/main" xmlns:r="http://schemas.openxmlformats.org/officeDocument/2006/relationships" xmlns:p="http://schemas.openxmlformats.org/presentationml/2006/main">
-  <p:cSld>
-    <p:spTree>
-      <p:nvGrpSpPr>
-        <p:cNvPr id="1" name=""/>
-        <p:cNvGrpSpPr/>
-        <p:nvPr/>
-      </p:nvGrpSpPr>
-      <p:grpSpPr>
-        <a:xfrm>
-          <a:off x="0" y="0"/>
-          <a:ext cx="0" cy="0"/>
-          <a:chOff x="0" y="0"/>
-          <a:chExt cx="0" cy="0"/>
-        </a:xfrm>
-      </p:grpSpPr>
-      <p:sp>
-        <p:nvSpPr>
-          <p:cNvPr id="4" name="직사각형 3"/>
-          <p:cNvSpPr/>
-          <p:nvPr/>
-        </p:nvSpPr>
-        <p:spPr>
-          <a:xfrm>
-            <a:off x="3067664" y="0"/>
-            <a:ext cx="6754762" cy="707923"/>
-          </a:xfrm>
-          <a:prstGeom prst="rect">
-            <a:avLst/>
-          </a:prstGeom>
-          <a:solidFill>
-            <a:schemeClr val="accent6"/>
-          </a:solidFill>
-        </p:spPr>
-        <p:style>
-          <a:lnRef idx="2">
-            <a:schemeClr val="accent1">
-              <a:shade val="50000"/>
-            </a:schemeClr>
-          </a:lnRef>
-          <a:fillRef idx="1">
-            <a:schemeClr val="accent1"/>
-          </a:fillRef>
-          <a:effectRef idx="0">
-            <a:schemeClr val="accent1"/>
-          </a:effectRef>
-          <a:fontRef idx="minor">
-            <a:schemeClr val="lt1"/>
-          </a:fontRef>
-        </p:style>
-        <p:txBody>
-          <a:bodyPr rtlCol="0" anchor="ctr"/>
-          <a:lstStyle/>
-          <a:p>
-            <a:pPr algn="ctr"/>
-            <a:endParaRPr lang="ko-KR" altLang="en-US" dirty="0"/>
-          </a:p>
-        </p:txBody>
-      </p:sp>
-      <p:sp>
-        <p:nvSpPr>
-          <p:cNvPr id="5" name="직사각형 4"/>
-          <p:cNvSpPr/>
-          <p:nvPr/>
-        </p:nvSpPr>
-        <p:spPr>
-          <a:xfrm>
-            <a:off x="3067664" y="707923"/>
-            <a:ext cx="6754762" cy="6150077"/>
-          </a:xfrm>
-          <a:prstGeom prst="rect">
-            <a:avLst/>
-          </a:prstGeom>
-          <a:solidFill>
-            <a:schemeClr val="accent6">
-              <a:lumMod val="20000"/>
-              <a:lumOff val="80000"/>
-            </a:schemeClr>
-          </a:solidFill>
-        </p:spPr>
-        <p:style>
-          <a:lnRef idx="2">
-            <a:schemeClr val="accent1">
-              <a:shade val="50000"/>
-            </a:schemeClr>
-          </a:lnRef>
-          <a:fillRef idx="1">
-            <a:schemeClr val="accent1"/>
-          </a:fillRef>
-          <a:effectRef idx="0">
-            <a:schemeClr val="accent1"/>
-          </a:effectRef>
-          <a:fontRef idx="minor">
-            <a:schemeClr val="lt1"/>
-          </a:fontRef>
-        </p:style>
-        <p:txBody>
-          <a:bodyPr rtlCol="0" anchor="ctr"/>
-          <a:lstStyle/>
-          <a:p>
-            <a:pPr algn="ctr"/>
-            <a:endParaRPr lang="ko-KR" altLang="en-US"/>
-          </a:p>
-        </p:txBody>
-      </p:sp>
-      <p:sp>
-        <p:nvSpPr>
-          <p:cNvPr id="7" name="직사각형 6"/>
-          <p:cNvSpPr/>
-          <p:nvPr/>
-        </p:nvSpPr>
-        <p:spPr>
-          <a:xfrm>
-            <a:off x="0" y="0"/>
-            <a:ext cx="2168013" cy="707923"/>
-          </a:xfrm>
-          <a:prstGeom prst="rect">
-            <a:avLst/>
-          </a:prstGeom>
-        </p:spPr>
-        <p:style>
-          <a:lnRef idx="2">
-            <a:schemeClr val="accent1">
-              <a:shade val="50000"/>
-            </a:schemeClr>
-          </a:lnRef>
-          <a:fillRef idx="1">
-            <a:schemeClr val="accent1"/>
-          </a:fillRef>
-          <a:effectRef idx="0">
-            <a:schemeClr val="accent1"/>
-          </a:effectRef>
-          <a:fontRef idx="minor">
-            <a:schemeClr val="lt1"/>
-          </a:fontRef>
-        </p:style>
-        <p:txBody>
-          <a:bodyPr rtlCol="0" anchor="ctr"/>
-          <a:lstStyle/>
-          <a:p>
-            <a:pPr algn="ctr"/>
-            <a:r>
-              <a:rPr lang="ko-KR" altLang="en-US" dirty="0" smtClean="0"/>
-              <a:t>리스트 생성</a:t>
-            </a:r>
-            <a:endParaRPr lang="en-US" altLang="ko-KR" dirty="0" smtClean="0"/>
-          </a:p>
-        </p:txBody>
-      </p:sp>
-      <p:sp>
-        <p:nvSpPr>
-          <p:cNvPr id="12" name="직사각형 11"/>
-          <p:cNvSpPr/>
-          <p:nvPr/>
-        </p:nvSpPr>
-        <p:spPr>
-          <a:xfrm>
-            <a:off x="3583857" y="1590521"/>
-            <a:ext cx="5722375" cy="3753465"/>
-          </a:xfrm>
-          <a:prstGeom prst="rect">
-            <a:avLst/>
-          </a:prstGeom>
-          <a:solidFill>
-            <a:schemeClr val="bg1"/>
-          </a:solidFill>
-        </p:spPr>
-        <p:style>
-          <a:lnRef idx="2">
-            <a:schemeClr val="accent1">
-              <a:shade val="50000"/>
-            </a:schemeClr>
-          </a:lnRef>
-          <a:fillRef idx="1">
-            <a:schemeClr val="accent1"/>
-          </a:fillRef>
-          <a:effectRef idx="0">
-            <a:schemeClr val="accent1"/>
-          </a:effectRef>
-          <a:fontRef idx="minor">
-            <a:schemeClr val="lt1"/>
-          </a:fontRef>
-        </p:style>
-        <p:txBody>
-          <a:bodyPr rtlCol="0" anchor="ctr"/>
-          <a:lstStyle/>
-          <a:p>
-            <a:pPr algn="ctr"/>
-            <a:endParaRPr lang="ko-KR" altLang="en-US"/>
-          </a:p>
-        </p:txBody>
-      </p:sp>
-      <p:sp>
-        <p:nvSpPr>
-          <p:cNvPr id="19" name="TextBox 18"/>
-          <p:cNvSpPr txBox="1"/>
-          <p:nvPr/>
-        </p:nvSpPr>
-        <p:spPr>
-          <a:xfrm>
-            <a:off x="5447248" y="198793"/>
-            <a:ext cx="1420582" cy="369332"/>
-          </a:xfrm>
-          <a:prstGeom prst="rect">
-            <a:avLst/>
-          </a:prstGeom>
-          <a:noFill/>
-        </p:spPr>
-        <p:txBody>
-          <a:bodyPr wrap="none" rtlCol="0">
-            <a:spAutoFit/>
-          </a:bodyPr>
-          <a:lstStyle/>
-          <a:p>
-            <a:r>
-              <a:rPr lang="ko-KR" altLang="en-US" dirty="0" smtClean="0"/>
-              <a:t>리스트 보기</a:t>
-            </a:r>
-            <a:endParaRPr lang="en-US" altLang="ko-KR" dirty="0" smtClean="0"/>
-          </a:p>
-        </p:txBody>
-      </p:sp>
-      <p:sp>
-        <p:nvSpPr>
-          <p:cNvPr id="20" name="TextBox 19"/>
-          <p:cNvSpPr txBox="1"/>
-          <p:nvPr/>
-        </p:nvSpPr>
-        <p:spPr>
-          <a:xfrm>
-            <a:off x="6867830" y="205856"/>
-            <a:ext cx="1420582" cy="369332"/>
-          </a:xfrm>
-          <a:prstGeom prst="rect">
-            <a:avLst/>
-          </a:prstGeom>
-          <a:noFill/>
-        </p:spPr>
-        <p:txBody>
-          <a:bodyPr wrap="none" rtlCol="0">
-            <a:spAutoFit/>
-          </a:bodyPr>
-          <a:lstStyle/>
-          <a:p>
-            <a:r>
-              <a:rPr lang="ko-KR" altLang="en-US" dirty="0" smtClean="0"/>
-              <a:t>리스트 관리</a:t>
-            </a:r>
-            <a:endParaRPr lang="en-US" altLang="ko-KR" dirty="0" smtClean="0"/>
-          </a:p>
-        </p:txBody>
-      </p:sp>
-      <p:sp>
-        <p:nvSpPr>
-          <p:cNvPr id="40" name="직사각형 39"/>
-          <p:cNvSpPr/>
-          <p:nvPr/>
-        </p:nvSpPr>
-        <p:spPr>
-          <a:xfrm>
-            <a:off x="3583857" y="5577658"/>
-            <a:ext cx="1150375" cy="474251"/>
-          </a:xfrm>
-          <a:prstGeom prst="rect">
-            <a:avLst/>
-          </a:prstGeom>
-          <a:solidFill>
-            <a:schemeClr val="bg1"/>
-          </a:solidFill>
-        </p:spPr>
-        <p:style>
-          <a:lnRef idx="2">
-            <a:schemeClr val="accent1">
-              <a:shade val="50000"/>
-            </a:schemeClr>
-          </a:lnRef>
-          <a:fillRef idx="1">
-            <a:schemeClr val="accent1"/>
-          </a:fillRef>
-          <a:effectRef idx="0">
-            <a:schemeClr val="accent1"/>
-          </a:effectRef>
-          <a:fontRef idx="minor">
-            <a:schemeClr val="lt1"/>
-          </a:fontRef>
-        </p:style>
-        <p:txBody>
-          <a:bodyPr rtlCol="0" anchor="ctr"/>
-          <a:lstStyle/>
-          <a:p>
-            <a:pPr algn="ctr"/>
-            <a:r>
-              <a:rPr lang="ko-KR" altLang="en-US" dirty="0" smtClean="0">
-                <a:solidFill>
-                  <a:srgbClr val="FF0000"/>
-                </a:solidFill>
-              </a:rPr>
-              <a:t>날짜</a:t>
-            </a:r>
-            <a:endParaRPr lang="en-US" altLang="ko-KR" dirty="0" smtClean="0">
-              <a:solidFill>
-                <a:srgbClr val="FF0000"/>
-              </a:solidFill>
-            </a:endParaRPr>
-          </a:p>
-        </p:txBody>
-      </p:sp>
-      <p:sp>
-        <p:nvSpPr>
-          <p:cNvPr id="41" name="직사각형 40"/>
-          <p:cNvSpPr/>
-          <p:nvPr/>
-        </p:nvSpPr>
-        <p:spPr>
-          <a:xfrm>
-            <a:off x="4955457" y="5577658"/>
-            <a:ext cx="1312608" cy="474251"/>
-          </a:xfrm>
-          <a:prstGeom prst="rect">
-            <a:avLst/>
-          </a:prstGeom>
-          <a:solidFill>
-            <a:schemeClr val="bg1"/>
-          </a:solidFill>
-        </p:spPr>
-        <p:style>
-          <a:lnRef idx="2">
-            <a:schemeClr val="accent1">
-              <a:shade val="50000"/>
-            </a:schemeClr>
-          </a:lnRef>
-          <a:fillRef idx="1">
-            <a:schemeClr val="accent1"/>
-          </a:fillRef>
-          <a:effectRef idx="0">
-            <a:schemeClr val="accent1"/>
-          </a:effectRef>
-          <a:fontRef idx="minor">
-            <a:schemeClr val="lt1"/>
-          </a:fontRef>
-        </p:style>
-        <p:txBody>
-          <a:bodyPr rtlCol="0" anchor="ctr"/>
-          <a:lstStyle/>
-          <a:p>
-            <a:pPr algn="ctr"/>
-            <a:r>
-              <a:rPr lang="ko-KR" altLang="en-US" dirty="0" smtClean="0">
-                <a:solidFill>
-                  <a:srgbClr val="FF0000"/>
-                </a:solidFill>
-              </a:rPr>
-              <a:t>등록</a:t>
-            </a:r>
-            <a:endParaRPr lang="en-US" altLang="ko-KR" dirty="0" smtClean="0">
-              <a:solidFill>
-                <a:srgbClr val="FF0000"/>
-              </a:solidFill>
-            </a:endParaRPr>
-          </a:p>
-        </p:txBody>
-      </p:sp>
-      <p:sp>
-        <p:nvSpPr>
-          <p:cNvPr id="42" name="TextBox 41"/>
-          <p:cNvSpPr txBox="1"/>
-          <p:nvPr/>
-        </p:nvSpPr>
-        <p:spPr>
-          <a:xfrm>
-            <a:off x="3583857" y="987517"/>
-            <a:ext cx="1189749" cy="369332"/>
-          </a:xfrm>
-          <a:prstGeom prst="rect">
-            <a:avLst/>
-          </a:prstGeom>
-          <a:noFill/>
-        </p:spPr>
-        <p:txBody>
-          <a:bodyPr wrap="none" rtlCol="0">
-            <a:spAutoFit/>
-          </a:bodyPr>
-          <a:lstStyle/>
-          <a:p>
-            <a:r>
-              <a:rPr lang="ko-KR" altLang="en-US" dirty="0" smtClean="0"/>
-              <a:t>내용 작성</a:t>
-            </a:r>
-            <a:endParaRPr lang="en-US" altLang="ko-KR" dirty="0" smtClean="0"/>
-          </a:p>
-        </p:txBody>
-      </p:sp>
-      <p:sp>
-        <p:nvSpPr>
-          <p:cNvPr id="43" name="TextBox 42"/>
-          <p:cNvSpPr txBox="1"/>
-          <p:nvPr/>
-        </p:nvSpPr>
-        <p:spPr>
-          <a:xfrm>
-            <a:off x="8288412" y="198793"/>
-            <a:ext cx="1420582" cy="369332"/>
-          </a:xfrm>
-          <a:prstGeom prst="rect">
-            <a:avLst/>
-          </a:prstGeom>
-          <a:noFill/>
-        </p:spPr>
-        <p:txBody>
-          <a:bodyPr wrap="none" rtlCol="0">
-            <a:spAutoFit/>
-          </a:bodyPr>
-          <a:lstStyle/>
-          <a:p>
-            <a:r>
-              <a:rPr lang="ko-KR" altLang="en-US" dirty="0" smtClean="0"/>
-              <a:t>리스트 </a:t>
-            </a:r>
-            <a:r>
-              <a:rPr lang="ko-KR" altLang="en-US" dirty="0" smtClean="0"/>
-              <a:t>생성</a:t>
-            </a:r>
-            <a:endParaRPr lang="en-US" altLang="ko-KR" dirty="0" smtClean="0"/>
-          </a:p>
-        </p:txBody>
-      </p:sp>
-    </p:spTree>
-    <p:extLst>
-      <p:ext uri="{BB962C8B-B14F-4D97-AF65-F5344CB8AC3E}">
-        <p14:creationId xmlns:p14="http://schemas.microsoft.com/office/powerpoint/2010/main" val="2348231836"/>
+        <p14:creationId xmlns:p14="http://schemas.microsoft.com/office/powerpoint/2010/main" val="173098122"/>
       </p:ext>
     </p:extLst>
   </p:cSld>

</xml_diff>